<commit_message>
Updated version of Idaszak_OSS_OpenSource.pptx
</commit_message>
<xml_diff>
--- a/2014-oss/day-18/Idaszak_OSS_OpenSource.pptx
+++ b/2014-oss/day-18/Idaszak_OSS_OpenSource.pptx
@@ -5,10 +5,10 @@
     <p:sldMasterId id="2147483648" r:id="rId4"/>
   </p:sldMasterIdLst>
   <p:notesMasterIdLst>
-    <p:notesMasterId r:id="rId23"/>
+    <p:notesMasterId r:id="rId25"/>
   </p:notesMasterIdLst>
   <p:handoutMasterIdLst>
-    <p:handoutMasterId r:id="rId24"/>
+    <p:handoutMasterId r:id="rId26"/>
   </p:handoutMasterIdLst>
   <p:sldIdLst>
     <p:sldId id="342" r:id="rId5"/>
@@ -24,11 +24,13 @@
     <p:sldId id="798" r:id="rId15"/>
     <p:sldId id="788" r:id="rId16"/>
     <p:sldId id="791" r:id="rId17"/>
-    <p:sldId id="796" r:id="rId18"/>
+    <p:sldId id="802" r:id="rId18"/>
     <p:sldId id="800" r:id="rId19"/>
-    <p:sldId id="801" r:id="rId20"/>
-    <p:sldId id="795" r:id="rId21"/>
-    <p:sldId id="785" r:id="rId22"/>
+    <p:sldId id="803" r:id="rId20"/>
+    <p:sldId id="804" r:id="rId21"/>
+    <p:sldId id="801" r:id="rId22"/>
+    <p:sldId id="795" r:id="rId23"/>
+    <p:sldId id="785" r:id="rId24"/>
   </p:sldIdLst>
   <p:sldSz cx="9144000" cy="6858000" type="screen4x3"/>
   <p:notesSz cx="7019925" cy="9305925"/>
@@ -228,7 +230,7 @@
           <a:p>
             <a:fld id="{9246E736-8DF2-4A67-8AD5-413DE77FF67A}" type="datetimeFigureOut">
               <a:rPr lang="en-US" smtClean="0"/>
-              <a:t>7/10/2014</a:t>
+              <a:t>8/4/2014</a:t>
             </a:fld>
             <a:endParaRPr lang="en-US" dirty="0"/>
           </a:p>
@@ -394,7 +396,7 @@
             <a:fld id="{6F706718-8F9B-4714-BDCA-44544253309B}" type="datetimeFigureOut">
               <a:rPr lang="en-US" smtClean="0"/>
               <a:pPr/>
-              <a:t>7/10/2014</a:t>
+              <a:t>8/4/2014</a:t>
             </a:fld>
             <a:endParaRPr lang="en-US" dirty="0"/>
           </a:p>
@@ -955,7 +957,7 @@
     </p:spTree>
     <p:extLst>
       <p:ext uri="{BB962C8B-B14F-4D97-AF65-F5344CB8AC3E}">
-        <p14:creationId xmlns:p14="http://schemas.microsoft.com/office/powerpoint/2010/main" val="3571203646"/>
+        <p14:creationId xmlns:p14="http://schemas.microsoft.com/office/powerpoint/2010/main" val="2169131031"/>
       </p:ext>
     </p:extLst>
   </p:cSld>
@@ -1009,17 +1011,10 @@
           <a:bodyPr/>
           <a:lstStyle/>
           <a:p>
-            <a:r>
-              <a:rPr lang="en-US" dirty="0" smtClean="0"/>
-              <a:t>Transparent</a:t>
-            </a:r>
-            <a:r>
-              <a:rPr lang="en-US" smtClean="0"/>
-              <a:t>, user-friendly way</a:t>
-            </a:r>
-          </a:p>
-          <a:p>
-            <a:endParaRPr lang="en-US"/>
+            <a:endParaRPr lang="en-US" baseline="0" dirty="0" smtClean="0"/>
+          </a:p>
+          <a:p>
+            <a:endParaRPr lang="en-US" dirty="0"/>
           </a:p>
         </p:txBody>
       </p:sp>
@@ -1042,6 +1037,189 @@
               <a:rPr lang="en-US" smtClean="0"/>
               <a:pPr/>
               <a:t>17</a:t>
+            </a:fld>
+            <a:endParaRPr lang="en-US" dirty="0"/>
+          </a:p>
+        </p:txBody>
+      </p:sp>
+    </p:spTree>
+    <p:extLst>
+      <p:ext uri="{BB962C8B-B14F-4D97-AF65-F5344CB8AC3E}">
+        <p14:creationId xmlns:p14="http://schemas.microsoft.com/office/powerpoint/2010/main" val="3081801580"/>
+      </p:ext>
+    </p:extLst>
+  </p:cSld>
+  <p:clrMapOvr>
+    <a:masterClrMapping/>
+  </p:clrMapOvr>
+</p:notes>
+</file>
+
+<file path=ppt/notesSlides/notesSlide13.xml><?xml version="1.0" encoding="utf-8"?>
+<p:notes xmlns:a="http://schemas.openxmlformats.org/drawingml/2006/main" xmlns:r="http://schemas.openxmlformats.org/officeDocument/2006/relationships" xmlns:p="http://schemas.openxmlformats.org/presentationml/2006/main">
+  <p:cSld>
+    <p:spTree>
+      <p:nvGrpSpPr>
+        <p:cNvPr id="1" name=""/>
+        <p:cNvGrpSpPr/>
+        <p:nvPr/>
+      </p:nvGrpSpPr>
+      <p:grpSpPr>
+        <a:xfrm>
+          <a:off x="0" y="0"/>
+          <a:ext cx="0" cy="0"/>
+          <a:chOff x="0" y="0"/>
+          <a:chExt cx="0" cy="0"/>
+        </a:xfrm>
+      </p:grpSpPr>
+      <p:sp>
+        <p:nvSpPr>
+          <p:cNvPr id="2" name="Slide Image Placeholder 1"/>
+          <p:cNvSpPr>
+            <a:spLocks noGrp="1" noRot="1" noChangeAspect="1"/>
+          </p:cNvSpPr>
+          <p:nvPr>
+            <p:ph type="sldImg"/>
+          </p:nvPr>
+        </p:nvSpPr>
+        <p:spPr/>
+      </p:sp>
+      <p:sp>
+        <p:nvSpPr>
+          <p:cNvPr id="3" name="Notes Placeholder 2"/>
+          <p:cNvSpPr>
+            <a:spLocks noGrp="1"/>
+          </p:cNvSpPr>
+          <p:nvPr>
+            <p:ph type="body" idx="1"/>
+          </p:nvPr>
+        </p:nvSpPr>
+        <p:spPr/>
+        <p:txBody>
+          <a:bodyPr/>
+          <a:lstStyle/>
+          <a:p>
+            <a:endParaRPr lang="en-US" baseline="0" dirty="0" smtClean="0"/>
+          </a:p>
+          <a:p>
+            <a:endParaRPr lang="en-US" dirty="0"/>
+          </a:p>
+        </p:txBody>
+      </p:sp>
+      <p:sp>
+        <p:nvSpPr>
+          <p:cNvPr id="4" name="Slide Number Placeholder 3"/>
+          <p:cNvSpPr>
+            <a:spLocks noGrp="1"/>
+          </p:cNvSpPr>
+          <p:nvPr>
+            <p:ph type="sldNum" sz="quarter" idx="10"/>
+          </p:nvPr>
+        </p:nvSpPr>
+        <p:spPr/>
+        <p:txBody>
+          <a:bodyPr/>
+          <a:lstStyle/>
+          <a:p>
+            <a:fld id="{0396E79A-87AA-4B9C-8CA3-60BB7F8FB89E}" type="slidenum">
+              <a:rPr lang="en-US" smtClean="0"/>
+              <a:pPr/>
+              <a:t>18</a:t>
+            </a:fld>
+            <a:endParaRPr lang="en-US" dirty="0"/>
+          </a:p>
+        </p:txBody>
+      </p:sp>
+    </p:spTree>
+    <p:extLst>
+      <p:ext uri="{BB962C8B-B14F-4D97-AF65-F5344CB8AC3E}">
+        <p14:creationId xmlns:p14="http://schemas.microsoft.com/office/powerpoint/2010/main" val="3571203646"/>
+      </p:ext>
+    </p:extLst>
+  </p:cSld>
+  <p:clrMapOvr>
+    <a:masterClrMapping/>
+  </p:clrMapOvr>
+</p:notes>
+</file>
+
+<file path=ppt/notesSlides/notesSlide14.xml><?xml version="1.0" encoding="utf-8"?>
+<p:notes xmlns:a="http://schemas.openxmlformats.org/drawingml/2006/main" xmlns:r="http://schemas.openxmlformats.org/officeDocument/2006/relationships" xmlns:p="http://schemas.openxmlformats.org/presentationml/2006/main">
+  <p:cSld>
+    <p:spTree>
+      <p:nvGrpSpPr>
+        <p:cNvPr id="1" name=""/>
+        <p:cNvGrpSpPr/>
+        <p:nvPr/>
+      </p:nvGrpSpPr>
+      <p:grpSpPr>
+        <a:xfrm>
+          <a:off x="0" y="0"/>
+          <a:ext cx="0" cy="0"/>
+          <a:chOff x="0" y="0"/>
+          <a:chExt cx="0" cy="0"/>
+        </a:xfrm>
+      </p:grpSpPr>
+      <p:sp>
+        <p:nvSpPr>
+          <p:cNvPr id="2" name="Slide Image Placeholder 1"/>
+          <p:cNvSpPr>
+            <a:spLocks noGrp="1" noRot="1" noChangeAspect="1"/>
+          </p:cNvSpPr>
+          <p:nvPr>
+            <p:ph type="sldImg"/>
+          </p:nvPr>
+        </p:nvSpPr>
+        <p:spPr/>
+      </p:sp>
+      <p:sp>
+        <p:nvSpPr>
+          <p:cNvPr id="3" name="Notes Placeholder 2"/>
+          <p:cNvSpPr>
+            <a:spLocks noGrp="1"/>
+          </p:cNvSpPr>
+          <p:nvPr>
+            <p:ph type="body" idx="1"/>
+          </p:nvPr>
+        </p:nvSpPr>
+        <p:spPr/>
+        <p:txBody>
+          <a:bodyPr/>
+          <a:lstStyle/>
+          <a:p>
+            <a:r>
+              <a:rPr lang="en-US" dirty="0" smtClean="0"/>
+              <a:t>Transparent</a:t>
+            </a:r>
+            <a:r>
+              <a:rPr lang="en-US" smtClean="0"/>
+              <a:t>, user-friendly way</a:t>
+            </a:r>
+          </a:p>
+          <a:p>
+            <a:endParaRPr lang="en-US"/>
+          </a:p>
+        </p:txBody>
+      </p:sp>
+      <p:sp>
+        <p:nvSpPr>
+          <p:cNvPr id="4" name="Slide Number Placeholder 3"/>
+          <p:cNvSpPr>
+            <a:spLocks noGrp="1"/>
+          </p:cNvSpPr>
+          <p:nvPr>
+            <p:ph type="sldNum" sz="quarter" idx="10"/>
+          </p:nvPr>
+        </p:nvSpPr>
+        <p:spPr/>
+        <p:txBody>
+          <a:bodyPr/>
+          <a:lstStyle/>
+          <a:p>
+            <a:fld id="{0396E79A-87AA-4B9C-8CA3-60BB7F8FB89E}" type="slidenum">
+              <a:rPr lang="en-US" smtClean="0"/>
+              <a:pPr/>
+              <a:t>19</a:t>
             </a:fld>
             <a:endParaRPr lang="en-US" dirty="0"/>
           </a:p>
@@ -2375,7 +2553,7 @@
     </p:spTree>
     <p:extLst>
       <p:ext uri="{BB962C8B-B14F-4D97-AF65-F5344CB8AC3E}">
-        <p14:creationId xmlns:p14="http://schemas.microsoft.com/office/powerpoint/2010/main" val="2892527487"/>
+        <p14:creationId xmlns:p14="http://schemas.microsoft.com/office/powerpoint/2010/main" val="3820775282"/>
       </p:ext>
     </p:extLst>
   </p:cSld>
@@ -2575,7 +2753,7 @@
             <a:fld id="{971973F9-422E-457B-9F92-077D34CBCE65}" type="datetimeFigureOut">
               <a:rPr lang="en-US" smtClean="0"/>
               <a:pPr/>
-              <a:t>7/10/2014</a:t>
+              <a:t>8/4/2014</a:t>
             </a:fld>
             <a:endParaRPr lang="en-US" dirty="0"/>
           </a:p>
@@ -2773,7 +2951,7 @@
             <a:fld id="{971973F9-422E-457B-9F92-077D34CBCE65}" type="datetimeFigureOut">
               <a:rPr lang="en-US" smtClean="0"/>
               <a:pPr/>
-              <a:t>7/10/2014</a:t>
+              <a:t>8/4/2014</a:t>
             </a:fld>
             <a:endParaRPr lang="en-US" dirty="0"/>
           </a:p>
@@ -2974,7 +3152,7 @@
             <a:fld id="{971973F9-422E-457B-9F92-077D34CBCE65}" type="datetimeFigureOut">
               <a:rPr lang="en-US" smtClean="0"/>
               <a:pPr/>
-              <a:t>7/10/2014</a:t>
+              <a:t>8/4/2014</a:t>
             </a:fld>
             <a:endParaRPr lang="en-US" dirty="0"/>
           </a:p>
@@ -3165,7 +3343,7 @@
             <a:fld id="{971973F9-422E-457B-9F92-077D34CBCE65}" type="datetimeFigureOut">
               <a:rPr lang="en-US" smtClean="0"/>
               <a:pPr/>
-              <a:t>7/10/2014</a:t>
+              <a:t>8/4/2014</a:t>
             </a:fld>
             <a:endParaRPr lang="en-US" dirty="0"/>
           </a:p>
@@ -3439,7 +3617,7 @@
             <a:fld id="{971973F9-422E-457B-9F92-077D34CBCE65}" type="datetimeFigureOut">
               <a:rPr lang="en-US" smtClean="0"/>
               <a:pPr/>
-              <a:t>7/10/2014</a:t>
+              <a:t>8/4/2014</a:t>
             </a:fld>
             <a:endParaRPr lang="en-US" dirty="0"/>
           </a:p>
@@ -3748,7 +3926,7 @@
             <a:fld id="{971973F9-422E-457B-9F92-077D34CBCE65}" type="datetimeFigureOut">
               <a:rPr lang="en-US" smtClean="0"/>
               <a:pPr/>
-              <a:t>7/10/2014</a:t>
+              <a:t>8/4/2014</a:t>
             </a:fld>
             <a:endParaRPr lang="en-US" dirty="0"/>
           </a:p>
@@ -4191,7 +4369,7 @@
             <a:fld id="{971973F9-422E-457B-9F92-077D34CBCE65}" type="datetimeFigureOut">
               <a:rPr lang="en-US" smtClean="0"/>
               <a:pPr/>
-              <a:t>7/10/2014</a:t>
+              <a:t>8/4/2014</a:t>
             </a:fld>
             <a:endParaRPr lang="en-US" dirty="0"/>
           </a:p>
@@ -4330,7 +4508,7 @@
             <a:fld id="{971973F9-422E-457B-9F92-077D34CBCE65}" type="datetimeFigureOut">
               <a:rPr lang="en-US" smtClean="0"/>
               <a:pPr/>
-              <a:t>7/10/2014</a:t>
+              <a:t>8/4/2014</a:t>
             </a:fld>
             <a:endParaRPr lang="en-US" dirty="0"/>
           </a:p>
@@ -4446,7 +4624,7 @@
             <a:fld id="{971973F9-422E-457B-9F92-077D34CBCE65}" type="datetimeFigureOut">
               <a:rPr lang="en-US" smtClean="0"/>
               <a:pPr/>
-              <a:t>7/10/2014</a:t>
+              <a:t>8/4/2014</a:t>
             </a:fld>
             <a:endParaRPr lang="en-US" dirty="0"/>
           </a:p>
@@ -4744,7 +4922,7 @@
             <a:fld id="{971973F9-422E-457B-9F92-077D34CBCE65}" type="datetimeFigureOut">
               <a:rPr lang="en-US" smtClean="0"/>
               <a:pPr/>
-              <a:t>7/10/2014</a:t>
+              <a:t>8/4/2014</a:t>
             </a:fld>
             <a:endParaRPr lang="en-US" dirty="0"/>
           </a:p>
@@ -5018,7 +5196,7 @@
             <a:fld id="{971973F9-422E-457B-9F92-077D34CBCE65}" type="datetimeFigureOut">
               <a:rPr lang="en-US" smtClean="0"/>
               <a:pPr/>
-              <a:t>7/10/2014</a:t>
+              <a:t>8/4/2014</a:t>
             </a:fld>
             <a:endParaRPr lang="en-US" dirty="0"/>
           </a:p>
@@ -5707,11 +5885,6 @@
               </a:rPr>
               <a:t>Open Source for Synthesis Workshop</a:t>
             </a:r>
-            <a:endParaRPr lang="en-US" sz="2400" dirty="0" smtClean="0">
-              <a:solidFill>
-                <a:srgbClr val="0070C0"/>
-              </a:solidFill>
-            </a:endParaRPr>
           </a:p>
           <a:p>
             <a:pPr algn="ctr"/>
@@ -5721,15 +5894,7 @@
                   <a:srgbClr val="0070C0"/>
                 </a:solidFill>
               </a:rPr>
-              <a:t>August 07, </a:t>
-            </a:r>
-            <a:r>
-              <a:rPr lang="en-US" sz="2400" dirty="0" smtClean="0">
-                <a:solidFill>
-                  <a:srgbClr val="0070C0"/>
-                </a:solidFill>
-              </a:rPr>
-              <a:t>2014</a:t>
+              <a:t>August 07, 2014</a:t>
             </a:r>
           </a:p>
           <a:p>
@@ -6606,92 +6771,27 @@
           </a:p>
         </p:txBody>
       </p:sp>
-      <p:pic>
-        <p:nvPicPr>
-          <p:cNvPr id="24" name="Picture 16" descr="PlainBlueInfinity2.png"/>
-          <p:cNvPicPr>
-            <a:picLocks noChangeAspect="1"/>
-          </p:cNvPicPr>
+      <p:sp>
+        <p:nvSpPr>
+          <p:cNvPr id="4" name="Rectangle 3"/>
+          <p:cNvSpPr/>
           <p:nvPr/>
-        </p:nvPicPr>
-        <p:blipFill>
-          <a:blip r:embed="rId3">
-            <a:extLst>
-              <a:ext uri="{28A0092B-C50C-407E-A947-70E740481C1C}">
-                <a14:useLocalDpi xmlns:a14="http://schemas.microsoft.com/office/drawing/2010/main" val="0"/>
-              </a:ext>
-            </a:extLst>
-          </a:blip>
-          <a:srcRect/>
-          <a:stretch>
-            <a:fillRect/>
-          </a:stretch>
-        </p:blipFill>
-        <p:spPr bwMode="auto">
-          <a:xfrm>
-            <a:off x="625471" y="648344"/>
-            <a:ext cx="7286625" cy="3046287"/>
+        </p:nvSpPr>
+        <p:spPr>
+          <a:xfrm>
+            <a:off x="-6349" y="5088470"/>
+            <a:ext cx="9154764" cy="1493200"/>
           </a:xfrm>
           <a:prstGeom prst="rect">
             <a:avLst/>
           </a:prstGeom>
-          <a:noFill/>
+          <a:solidFill>
+            <a:srgbClr val="2A81C4"/>
+          </a:solidFill>
           <a:ln>
             <a:noFill/>
           </a:ln>
-          <a:extLst>
-            <a:ext uri="{909E8E84-426E-40DD-AFC4-6F175D3DCCD1}">
-              <a14:hiddenFill xmlns:a14="http://schemas.microsoft.com/office/drawing/2010/main">
-                <a:solidFill>
-                  <a:srgbClr val="FFFFFF"/>
-                </a:solidFill>
-              </a14:hiddenFill>
-            </a:ext>
-            <a:ext uri="{91240B29-F687-4F45-9708-019B960494DF}">
-              <a14:hiddenLine xmlns:a14="http://schemas.microsoft.com/office/drawing/2010/main" w="9525">
-                <a:solidFill>
-                  <a:srgbClr val="000000"/>
-                </a:solidFill>
-                <a:miter lim="800000"/>
-                <a:headEnd/>
-                <a:tailEnd/>
-              </a14:hiddenLine>
-            </a:ext>
-          </a:extLst>
-        </p:spPr>
-      </p:pic>
-      <p:sp>
-        <p:nvSpPr>
-          <p:cNvPr id="25" name="Rounded Rectangle 24"/>
-          <p:cNvSpPr/>
-          <p:nvPr/>
-        </p:nvSpPr>
-        <p:spPr>
-          <a:xfrm>
-            <a:off x="747708" y="134677"/>
-            <a:ext cx="1207157" cy="988732"/>
-          </a:xfrm>
-          <a:prstGeom prst="roundRect">
-            <a:avLst/>
-          </a:prstGeom>
-          <a:gradFill>
-            <a:gsLst>
-              <a:gs pos="0">
-                <a:srgbClr val="F9FFB3"/>
-              </a:gs>
-              <a:gs pos="100000">
-                <a:schemeClr val="bg1"/>
-              </a:gs>
-            </a:gsLst>
-          </a:gradFill>
-          <a:ln>
-            <a:solidFill>
-              <a:schemeClr val="accent6">
-                <a:lumMod val="60000"/>
-                <a:lumOff val="40000"/>
-              </a:schemeClr>
-            </a:solidFill>
-          </a:ln>
+          <a:effectLst/>
         </p:spPr>
         <p:style>
           <a:lnRef idx="1">
@@ -6708,1319 +6808,6 @@
           </a:fontRef>
         </p:style>
         <p:txBody>
-          <a:bodyPr anchor="ctr"/>
-          <a:lstStyle/>
-          <a:p>
-            <a:pPr algn="ctr" fontAlgn="auto">
-              <a:spcBef>
-                <a:spcPts val="0"/>
-              </a:spcBef>
-              <a:spcAft>
-                <a:spcPts val="0"/>
-              </a:spcAft>
-              <a:defRPr/>
-            </a:pPr>
-            <a:r>
-              <a:rPr lang="en-US" sz="1400" b="1" dirty="0">
-                <a:solidFill>
-                  <a:srgbClr val="000000"/>
-                </a:solidFill>
-              </a:rPr>
-              <a:t>1. Determine Community Priorities</a:t>
-            </a:r>
-            <a:endParaRPr lang="en-US" sz="1400" dirty="0">
-              <a:solidFill>
-                <a:srgbClr val="000000"/>
-              </a:solidFill>
-            </a:endParaRPr>
-          </a:p>
-        </p:txBody>
-      </p:sp>
-      <p:sp>
-        <p:nvSpPr>
-          <p:cNvPr id="26" name="Rounded Rectangle 25"/>
-          <p:cNvSpPr/>
-          <p:nvPr/>
-        </p:nvSpPr>
-        <p:spPr>
-          <a:xfrm>
-            <a:off x="5277905" y="2996412"/>
-            <a:ext cx="1207156" cy="990189"/>
-          </a:xfrm>
-          <a:prstGeom prst="roundRect">
-            <a:avLst/>
-          </a:prstGeom>
-          <a:gradFill>
-            <a:gsLst>
-              <a:gs pos="0">
-                <a:srgbClr val="F9FFB3"/>
-              </a:gs>
-              <a:gs pos="100000">
-                <a:schemeClr val="bg1"/>
-              </a:gs>
-            </a:gsLst>
-          </a:gradFill>
-          <a:ln>
-            <a:solidFill>
-              <a:schemeClr val="accent6">
-                <a:lumMod val="60000"/>
-                <a:lumOff val="40000"/>
-              </a:schemeClr>
-            </a:solidFill>
-          </a:ln>
-        </p:spPr>
-        <p:style>
-          <a:lnRef idx="1">
-            <a:schemeClr val="accent1"/>
-          </a:lnRef>
-          <a:fillRef idx="3">
-            <a:schemeClr val="accent1"/>
-          </a:fillRef>
-          <a:effectRef idx="2">
-            <a:schemeClr val="accent1"/>
-          </a:effectRef>
-          <a:fontRef idx="minor">
-            <a:schemeClr val="lt1"/>
-          </a:fontRef>
-        </p:style>
-        <p:txBody>
-          <a:bodyPr anchor="ctr">
-            <a:normAutofit/>
-          </a:bodyPr>
-          <a:lstStyle/>
-          <a:p>
-            <a:pPr algn="ctr" fontAlgn="auto">
-              <a:spcBef>
-                <a:spcPts val="0"/>
-              </a:spcBef>
-              <a:spcAft>
-                <a:spcPts val="0"/>
-              </a:spcAft>
-              <a:defRPr/>
-            </a:pPr>
-            <a:r>
-              <a:rPr lang="en-US" sz="1400" b="1" dirty="0">
-                <a:solidFill>
-                  <a:srgbClr val="000000"/>
-                </a:solidFill>
-              </a:rPr>
-              <a:t/>
-            </a:r>
-            <a:br>
-              <a:rPr lang="en-US" sz="1400" b="1" dirty="0">
-                <a:solidFill>
-                  <a:srgbClr val="000000"/>
-                </a:solidFill>
-              </a:rPr>
-            </a:br>
-            <a:r>
-              <a:rPr lang="en-US" sz="1400" b="1" dirty="0">
-                <a:solidFill>
-                  <a:srgbClr val="000000"/>
-                </a:solidFill>
-              </a:rPr>
-              <a:t>3. Design</a:t>
-            </a:r>
-          </a:p>
-          <a:p>
-            <a:pPr algn="ctr" fontAlgn="auto">
-              <a:spcBef>
-                <a:spcPts val="0"/>
-              </a:spcBef>
-              <a:spcAft>
-                <a:spcPts val="0"/>
-              </a:spcAft>
-              <a:defRPr/>
-            </a:pPr>
-            <a:endParaRPr lang="en-US" sz="1400" dirty="0">
-              <a:solidFill>
-                <a:srgbClr val="000000"/>
-              </a:solidFill>
-            </a:endParaRPr>
-          </a:p>
-        </p:txBody>
-      </p:sp>
-      <p:sp>
-        <p:nvSpPr>
-          <p:cNvPr id="27" name="Rounded Rectangle 26"/>
-          <p:cNvSpPr/>
-          <p:nvPr/>
-        </p:nvSpPr>
-        <p:spPr>
-          <a:xfrm>
-            <a:off x="7668966" y="1726164"/>
-            <a:ext cx="1207156" cy="990189"/>
-          </a:xfrm>
-          <a:prstGeom prst="roundRect">
-            <a:avLst/>
-          </a:prstGeom>
-          <a:gradFill>
-            <a:gsLst>
-              <a:gs pos="0">
-                <a:srgbClr val="F9FFB3"/>
-              </a:gs>
-              <a:gs pos="100000">
-                <a:schemeClr val="bg1"/>
-              </a:gs>
-            </a:gsLst>
-          </a:gradFill>
-          <a:ln>
-            <a:solidFill>
-              <a:schemeClr val="accent6">
-                <a:lumMod val="60000"/>
-                <a:lumOff val="40000"/>
-              </a:schemeClr>
-            </a:solidFill>
-          </a:ln>
-        </p:spPr>
-        <p:style>
-          <a:lnRef idx="1">
-            <a:schemeClr val="accent1"/>
-          </a:lnRef>
-          <a:fillRef idx="3">
-            <a:schemeClr val="accent1"/>
-          </a:fillRef>
-          <a:effectRef idx="2">
-            <a:schemeClr val="accent1"/>
-          </a:effectRef>
-          <a:fontRef idx="minor">
-            <a:schemeClr val="lt1"/>
-          </a:fontRef>
-        </p:style>
-        <p:txBody>
-          <a:bodyPr anchor="ctr"/>
-          <a:lstStyle/>
-          <a:p>
-            <a:pPr algn="ctr" fontAlgn="auto">
-              <a:spcBef>
-                <a:spcPts val="0"/>
-              </a:spcBef>
-              <a:spcAft>
-                <a:spcPts val="0"/>
-              </a:spcAft>
-              <a:defRPr/>
-            </a:pPr>
-            <a:endParaRPr lang="en-US" sz="1400" b="1" dirty="0">
-              <a:solidFill>
-                <a:srgbClr val="000000"/>
-              </a:solidFill>
-            </a:endParaRPr>
-          </a:p>
-          <a:p>
-            <a:pPr algn="ctr" fontAlgn="auto">
-              <a:spcBef>
-                <a:spcPts val="0"/>
-              </a:spcBef>
-              <a:spcAft>
-                <a:spcPts val="0"/>
-              </a:spcAft>
-              <a:defRPr/>
-            </a:pPr>
-            <a:r>
-              <a:rPr lang="en-US" sz="1400" b="1" dirty="0">
-                <a:solidFill>
-                  <a:srgbClr val="000000"/>
-                </a:solidFill>
-              </a:rPr>
-              <a:t>4. Implement</a:t>
-            </a:r>
-            <a:endParaRPr lang="en-US" sz="1400" dirty="0">
-              <a:solidFill>
-                <a:srgbClr val="000000"/>
-              </a:solidFill>
-            </a:endParaRPr>
-          </a:p>
-          <a:p>
-            <a:pPr algn="ctr" fontAlgn="auto">
-              <a:spcBef>
-                <a:spcPts val="0"/>
-              </a:spcBef>
-              <a:spcAft>
-                <a:spcPts val="0"/>
-              </a:spcAft>
-              <a:defRPr/>
-            </a:pPr>
-            <a:endParaRPr lang="en-US" sz="1400" dirty="0">
-              <a:solidFill>
-                <a:srgbClr val="000000"/>
-              </a:solidFill>
-            </a:endParaRPr>
-          </a:p>
-        </p:txBody>
-      </p:sp>
-      <p:sp>
-        <p:nvSpPr>
-          <p:cNvPr id="28" name="Rounded Rectangle 27"/>
-          <p:cNvSpPr/>
-          <p:nvPr/>
-        </p:nvSpPr>
-        <p:spPr>
-          <a:xfrm>
-            <a:off x="5775290" y="119990"/>
-            <a:ext cx="1288702" cy="990189"/>
-          </a:xfrm>
-          <a:prstGeom prst="roundRect">
-            <a:avLst/>
-          </a:prstGeom>
-          <a:gradFill>
-            <a:gsLst>
-              <a:gs pos="0">
-                <a:srgbClr val="F9FFB3"/>
-              </a:gs>
-              <a:gs pos="100000">
-                <a:schemeClr val="bg1"/>
-              </a:gs>
-            </a:gsLst>
-          </a:gradFill>
-          <a:ln>
-            <a:solidFill>
-              <a:schemeClr val="accent6">
-                <a:lumMod val="60000"/>
-                <a:lumOff val="40000"/>
-              </a:schemeClr>
-            </a:solidFill>
-          </a:ln>
-        </p:spPr>
-        <p:style>
-          <a:lnRef idx="1">
-            <a:schemeClr val="accent1"/>
-          </a:lnRef>
-          <a:fillRef idx="3">
-            <a:schemeClr val="accent1"/>
-          </a:fillRef>
-          <a:effectRef idx="2">
-            <a:schemeClr val="accent1"/>
-          </a:effectRef>
-          <a:fontRef idx="minor">
-            <a:schemeClr val="lt1"/>
-          </a:fontRef>
-        </p:style>
-        <p:txBody>
-          <a:bodyPr anchor="ctr"/>
-          <a:lstStyle/>
-          <a:p>
-            <a:pPr algn="ctr" fontAlgn="auto">
-              <a:spcBef>
-                <a:spcPts val="0"/>
-              </a:spcBef>
-              <a:spcAft>
-                <a:spcPts val="0"/>
-              </a:spcAft>
-              <a:defRPr/>
-            </a:pPr>
-            <a:endParaRPr lang="en-US" sz="1400" b="1" dirty="0">
-              <a:solidFill>
-                <a:srgbClr val="000000"/>
-              </a:solidFill>
-            </a:endParaRPr>
-          </a:p>
-          <a:p>
-            <a:pPr algn="ctr" fontAlgn="auto">
-              <a:spcBef>
-                <a:spcPts val="0"/>
-              </a:spcBef>
-              <a:spcAft>
-                <a:spcPts val="0"/>
-              </a:spcAft>
-              <a:defRPr/>
-            </a:pPr>
-            <a:r>
-              <a:rPr lang="en-US" sz="1400" b="1" dirty="0">
-                <a:solidFill>
-                  <a:srgbClr val="000000"/>
-                </a:solidFill>
-              </a:rPr>
-              <a:t>5.Investigate and Refine</a:t>
-            </a:r>
-            <a:br>
-              <a:rPr lang="en-US" sz="1400" b="1" dirty="0">
-                <a:solidFill>
-                  <a:srgbClr val="000000"/>
-                </a:solidFill>
-              </a:rPr>
-            </a:br>
-            <a:endParaRPr lang="en-US" sz="1400" dirty="0">
-              <a:solidFill>
-                <a:srgbClr val="000000"/>
-              </a:solidFill>
-            </a:endParaRPr>
-          </a:p>
-        </p:txBody>
-      </p:sp>
-      <p:sp>
-        <p:nvSpPr>
-          <p:cNvPr id="29" name="Rounded Rectangle 28"/>
-          <p:cNvSpPr/>
-          <p:nvPr/>
-        </p:nvSpPr>
-        <p:spPr>
-          <a:xfrm>
-            <a:off x="2963858" y="2996412"/>
-            <a:ext cx="1207157" cy="988732"/>
-          </a:xfrm>
-          <a:prstGeom prst="roundRect">
-            <a:avLst/>
-          </a:prstGeom>
-          <a:gradFill>
-            <a:gsLst>
-              <a:gs pos="0">
-                <a:srgbClr val="F9FFB3"/>
-              </a:gs>
-              <a:gs pos="100000">
-                <a:schemeClr val="bg1"/>
-              </a:gs>
-            </a:gsLst>
-          </a:gradFill>
-          <a:ln>
-            <a:solidFill>
-              <a:schemeClr val="accent6">
-                <a:lumMod val="60000"/>
-                <a:lumOff val="40000"/>
-              </a:schemeClr>
-            </a:solidFill>
-          </a:ln>
-        </p:spPr>
-        <p:style>
-          <a:lnRef idx="1">
-            <a:schemeClr val="accent1"/>
-          </a:lnRef>
-          <a:fillRef idx="3">
-            <a:schemeClr val="accent1"/>
-          </a:fillRef>
-          <a:effectRef idx="2">
-            <a:schemeClr val="accent1"/>
-          </a:effectRef>
-          <a:fontRef idx="minor">
-            <a:schemeClr val="lt1"/>
-          </a:fontRef>
-        </p:style>
-        <p:txBody>
-          <a:bodyPr anchor="ctr"/>
-          <a:lstStyle/>
-          <a:p>
-            <a:pPr algn="ctr" fontAlgn="auto">
-              <a:spcBef>
-                <a:spcPts val="0"/>
-              </a:spcBef>
-              <a:spcAft>
-                <a:spcPts val="0"/>
-              </a:spcAft>
-              <a:defRPr/>
-            </a:pPr>
-            <a:r>
-              <a:rPr lang="en-US" sz="1400" b="1" dirty="0">
-                <a:solidFill>
-                  <a:srgbClr val="000000"/>
-                </a:solidFill>
-              </a:rPr>
-              <a:t>6. Publish</a:t>
-            </a:r>
-            <a:endParaRPr lang="en-US" sz="1400" dirty="0">
-              <a:solidFill>
-                <a:srgbClr val="000000"/>
-              </a:solidFill>
-            </a:endParaRPr>
-          </a:p>
-        </p:txBody>
-      </p:sp>
-      <p:sp>
-        <p:nvSpPr>
-          <p:cNvPr id="30" name="Rounded Rectangle 29"/>
-          <p:cNvSpPr/>
-          <p:nvPr/>
-        </p:nvSpPr>
-        <p:spPr>
-          <a:xfrm>
-            <a:off x="747708" y="2801149"/>
-            <a:ext cx="1207157" cy="988733"/>
-          </a:xfrm>
-          <a:prstGeom prst="roundRect">
-            <a:avLst/>
-          </a:prstGeom>
-          <a:gradFill>
-            <a:gsLst>
-              <a:gs pos="0">
-                <a:srgbClr val="F9FFB3"/>
-              </a:gs>
-              <a:gs pos="100000">
-                <a:schemeClr val="bg1"/>
-              </a:gs>
-            </a:gsLst>
-          </a:gradFill>
-          <a:ln>
-            <a:solidFill>
-              <a:schemeClr val="accent6">
-                <a:lumMod val="60000"/>
-                <a:lumOff val="40000"/>
-              </a:schemeClr>
-            </a:solidFill>
-          </a:ln>
-        </p:spPr>
-        <p:style>
-          <a:lnRef idx="1">
-            <a:schemeClr val="accent1"/>
-          </a:lnRef>
-          <a:fillRef idx="3">
-            <a:schemeClr val="accent1"/>
-          </a:fillRef>
-          <a:effectRef idx="2">
-            <a:schemeClr val="accent1"/>
-          </a:effectRef>
-          <a:fontRef idx="minor">
-            <a:schemeClr val="lt1"/>
-          </a:fontRef>
-        </p:style>
-        <p:txBody>
-          <a:bodyPr anchor="ctr"/>
-          <a:lstStyle/>
-          <a:p>
-            <a:pPr algn="ctr" fontAlgn="auto">
-              <a:spcBef>
-                <a:spcPts val="0"/>
-              </a:spcBef>
-              <a:spcAft>
-                <a:spcPts val="0"/>
-              </a:spcAft>
-              <a:defRPr/>
-            </a:pPr>
-            <a:endParaRPr lang="en-US" sz="1400" b="1" dirty="0">
-              <a:solidFill>
-                <a:srgbClr val="000000"/>
-              </a:solidFill>
-            </a:endParaRPr>
-          </a:p>
-          <a:p>
-            <a:pPr algn="ctr" fontAlgn="auto">
-              <a:spcBef>
-                <a:spcPts val="0"/>
-              </a:spcBef>
-              <a:spcAft>
-                <a:spcPts val="0"/>
-              </a:spcAft>
-              <a:defRPr/>
-            </a:pPr>
-            <a:r>
-              <a:rPr lang="en-US" sz="1400" b="1" dirty="0">
-                <a:solidFill>
-                  <a:srgbClr val="000000"/>
-                </a:solidFill>
-              </a:rPr>
-              <a:t>7. Test and Refine</a:t>
-            </a:r>
-            <a:br>
-              <a:rPr lang="en-US" sz="1400" b="1" dirty="0">
-                <a:solidFill>
-                  <a:srgbClr val="000000"/>
-                </a:solidFill>
-              </a:rPr>
-            </a:br>
-            <a:endParaRPr lang="en-US" sz="1400" dirty="0">
-              <a:solidFill>
-                <a:srgbClr val="000000"/>
-              </a:solidFill>
-            </a:endParaRPr>
-          </a:p>
-        </p:txBody>
-      </p:sp>
-      <p:sp>
-        <p:nvSpPr>
-          <p:cNvPr id="31" name="Right Arrow 30"/>
-          <p:cNvSpPr/>
-          <p:nvPr/>
-        </p:nvSpPr>
-        <p:spPr>
-          <a:xfrm rot="1064796">
-            <a:off x="2274688" y="838820"/>
-            <a:ext cx="474708" cy="203862"/>
-          </a:xfrm>
-          <a:prstGeom prst="rightArrow">
-            <a:avLst/>
-          </a:prstGeom>
-        </p:spPr>
-        <p:style>
-          <a:lnRef idx="1">
-            <a:schemeClr val="accent1"/>
-          </a:lnRef>
-          <a:fillRef idx="3">
-            <a:schemeClr val="accent1"/>
-          </a:fillRef>
-          <a:effectRef idx="2">
-            <a:schemeClr val="accent1"/>
-          </a:effectRef>
-          <a:fontRef idx="minor">
-            <a:schemeClr val="lt1"/>
-          </a:fontRef>
-        </p:style>
-        <p:txBody>
-          <a:bodyPr anchor="ctr"/>
-          <a:lstStyle/>
-          <a:p>
-            <a:pPr algn="ctr" fontAlgn="auto">
-              <a:spcBef>
-                <a:spcPts val="0"/>
-              </a:spcBef>
-              <a:spcAft>
-                <a:spcPts val="0"/>
-              </a:spcAft>
-              <a:defRPr/>
-            </a:pPr>
-            <a:endParaRPr lang="en-US"/>
-          </a:p>
-        </p:txBody>
-      </p:sp>
-      <p:sp>
-        <p:nvSpPr>
-          <p:cNvPr id="32" name="Right Arrow 31"/>
-          <p:cNvSpPr/>
-          <p:nvPr/>
-        </p:nvSpPr>
-        <p:spPr>
-          <a:xfrm rot="2458881">
-            <a:off x="3435645" y="2089919"/>
-            <a:ext cx="1699339" cy="203862"/>
-          </a:xfrm>
-          <a:prstGeom prst="rightArrow">
-            <a:avLst/>
-          </a:prstGeom>
-        </p:spPr>
-        <p:style>
-          <a:lnRef idx="1">
-            <a:schemeClr val="accent1"/>
-          </a:lnRef>
-          <a:fillRef idx="3">
-            <a:schemeClr val="accent1"/>
-          </a:fillRef>
-          <a:effectRef idx="2">
-            <a:schemeClr val="accent1"/>
-          </a:effectRef>
-          <a:fontRef idx="minor">
-            <a:schemeClr val="lt1"/>
-          </a:fontRef>
-        </p:style>
-        <p:txBody>
-          <a:bodyPr anchor="ctr"/>
-          <a:lstStyle/>
-          <a:p>
-            <a:pPr algn="ctr" fontAlgn="auto">
-              <a:spcBef>
-                <a:spcPts val="0"/>
-              </a:spcBef>
-              <a:spcAft>
-                <a:spcPts val="0"/>
-              </a:spcAft>
-              <a:defRPr/>
-            </a:pPr>
-            <a:endParaRPr lang="en-US"/>
-          </a:p>
-        </p:txBody>
-      </p:sp>
-      <p:sp>
-        <p:nvSpPr>
-          <p:cNvPr id="33" name="Right Arrow 32"/>
-          <p:cNvSpPr/>
-          <p:nvPr/>
-        </p:nvSpPr>
-        <p:spPr>
-          <a:xfrm rot="18935530">
-            <a:off x="6468423" y="2866306"/>
-            <a:ext cx="1191139" cy="176196"/>
-          </a:xfrm>
-          <a:prstGeom prst="rightArrow">
-            <a:avLst/>
-          </a:prstGeom>
-        </p:spPr>
-        <p:style>
-          <a:lnRef idx="1">
-            <a:schemeClr val="accent1"/>
-          </a:lnRef>
-          <a:fillRef idx="3">
-            <a:schemeClr val="accent1"/>
-          </a:fillRef>
-          <a:effectRef idx="2">
-            <a:schemeClr val="accent1"/>
-          </a:effectRef>
-          <a:fontRef idx="minor">
-            <a:schemeClr val="lt1"/>
-          </a:fontRef>
-        </p:style>
-        <p:txBody>
-          <a:bodyPr anchor="ctr"/>
-          <a:lstStyle/>
-          <a:p>
-            <a:pPr algn="ctr" fontAlgn="auto">
-              <a:spcBef>
-                <a:spcPts val="0"/>
-              </a:spcBef>
-              <a:spcAft>
-                <a:spcPts val="0"/>
-              </a:spcAft>
-              <a:defRPr/>
-            </a:pPr>
-            <a:endParaRPr lang="en-US"/>
-          </a:p>
-        </p:txBody>
-      </p:sp>
-      <p:sp>
-        <p:nvSpPr>
-          <p:cNvPr id="34" name="Right Arrow 33"/>
-          <p:cNvSpPr/>
-          <p:nvPr/>
-        </p:nvSpPr>
-        <p:spPr>
-          <a:xfrm rot="8282398">
-            <a:off x="3328402" y="1822192"/>
-            <a:ext cx="2471104" cy="203862"/>
-          </a:xfrm>
-          <a:prstGeom prst="rightArrow">
-            <a:avLst/>
-          </a:prstGeom>
-        </p:spPr>
-        <p:style>
-          <a:lnRef idx="1">
-            <a:schemeClr val="accent1"/>
-          </a:lnRef>
-          <a:fillRef idx="3">
-            <a:schemeClr val="accent1"/>
-          </a:fillRef>
-          <a:effectRef idx="2">
-            <a:schemeClr val="accent1"/>
-          </a:effectRef>
-          <a:fontRef idx="minor">
-            <a:schemeClr val="lt1"/>
-          </a:fontRef>
-        </p:style>
-        <p:txBody>
-          <a:bodyPr anchor="ctr"/>
-          <a:lstStyle/>
-          <a:p>
-            <a:pPr algn="ctr" fontAlgn="auto">
-              <a:spcBef>
-                <a:spcPts val="0"/>
-              </a:spcBef>
-              <a:spcAft>
-                <a:spcPts val="0"/>
-              </a:spcAft>
-              <a:defRPr/>
-            </a:pPr>
-            <a:endParaRPr lang="en-US"/>
-          </a:p>
-        </p:txBody>
-      </p:sp>
-      <p:sp>
-        <p:nvSpPr>
-          <p:cNvPr id="35" name="Right Arrow 34"/>
-          <p:cNvSpPr/>
-          <p:nvPr/>
-        </p:nvSpPr>
-        <p:spPr>
-          <a:xfrm rot="10800000">
-            <a:off x="2203446" y="3235182"/>
-            <a:ext cx="474708" cy="203862"/>
-          </a:xfrm>
-          <a:prstGeom prst="rightArrow">
-            <a:avLst/>
-          </a:prstGeom>
-        </p:spPr>
-        <p:style>
-          <a:lnRef idx="1">
-            <a:schemeClr val="accent1"/>
-          </a:lnRef>
-          <a:fillRef idx="3">
-            <a:schemeClr val="accent1"/>
-          </a:fillRef>
-          <a:effectRef idx="2">
-            <a:schemeClr val="accent1"/>
-          </a:effectRef>
-          <a:fontRef idx="minor">
-            <a:schemeClr val="lt1"/>
-          </a:fontRef>
-        </p:style>
-        <p:txBody>
-          <a:bodyPr anchor="ctr"/>
-          <a:lstStyle/>
-          <a:p>
-            <a:pPr algn="ctr" fontAlgn="auto">
-              <a:spcBef>
-                <a:spcPts val="0"/>
-              </a:spcBef>
-              <a:spcAft>
-                <a:spcPts val="0"/>
-              </a:spcAft>
-              <a:defRPr/>
-            </a:pPr>
-            <a:endParaRPr lang="en-US"/>
-          </a:p>
-        </p:txBody>
-      </p:sp>
-      <p:sp>
-        <p:nvSpPr>
-          <p:cNvPr id="36" name="Right Arrow 35"/>
-          <p:cNvSpPr/>
-          <p:nvPr/>
-        </p:nvSpPr>
-        <p:spPr>
-          <a:xfrm rot="16200000">
-            <a:off x="542861" y="1856842"/>
-            <a:ext cx="1198418" cy="203862"/>
-          </a:xfrm>
-          <a:prstGeom prst="rightArrow">
-            <a:avLst/>
-          </a:prstGeom>
-        </p:spPr>
-        <p:style>
-          <a:lnRef idx="1">
-            <a:schemeClr val="accent1"/>
-          </a:lnRef>
-          <a:fillRef idx="3">
-            <a:schemeClr val="accent1"/>
-          </a:fillRef>
-          <a:effectRef idx="2">
-            <a:schemeClr val="accent1"/>
-          </a:effectRef>
-          <a:fontRef idx="minor">
-            <a:schemeClr val="lt1"/>
-          </a:fontRef>
-        </p:style>
-        <p:txBody>
-          <a:bodyPr anchor="ctr"/>
-          <a:lstStyle/>
-          <a:p>
-            <a:pPr algn="ctr" fontAlgn="auto">
-              <a:spcBef>
-                <a:spcPts val="0"/>
-              </a:spcBef>
-              <a:spcAft>
-                <a:spcPts val="0"/>
-              </a:spcAft>
-              <a:defRPr/>
-            </a:pPr>
-            <a:endParaRPr lang="en-US"/>
-          </a:p>
-        </p:txBody>
-      </p:sp>
-      <p:sp>
-        <p:nvSpPr>
-          <p:cNvPr id="37" name="TextBox 15"/>
-          <p:cNvSpPr txBox="1">
-            <a:spLocks noChangeArrowheads="1"/>
-          </p:cNvSpPr>
-          <p:nvPr/>
-        </p:nvSpPr>
-        <p:spPr bwMode="auto">
-          <a:xfrm>
-            <a:off x="1783338" y="1932569"/>
-            <a:ext cx="1349860" cy="461665"/>
-          </a:xfrm>
-          <a:prstGeom prst="rect">
-            <a:avLst/>
-          </a:prstGeom>
-          <a:solidFill>
-            <a:schemeClr val="bg1"/>
-          </a:solidFill>
-          <a:ln>
-            <a:noFill/>
-          </a:ln>
-          <a:extLst>
-            <a:ext uri="{91240B29-F687-4F45-9708-019B960494DF}">
-              <a14:hiddenLine xmlns:a14="http://schemas.microsoft.com/office/drawing/2010/main" w="9525">
-                <a:solidFill>
-                  <a:srgbClr val="000000"/>
-                </a:solidFill>
-                <a:miter lim="800000"/>
-                <a:headEnd/>
-                <a:tailEnd/>
-              </a14:hiddenLine>
-            </a:ext>
-          </a:extLst>
-        </p:spPr>
-        <p:txBody>
-          <a:bodyPr wrap="square">
-            <a:spAutoFit/>
-          </a:bodyPr>
-          <a:lstStyle>
-            <a:lvl1pPr>
-              <a:defRPr>
-                <a:solidFill>
-                  <a:schemeClr val="tx1"/>
-                </a:solidFill>
-                <a:latin typeface="Calibri" charset="0"/>
-                <a:ea typeface="Geneva" charset="0"/>
-                <a:cs typeface="Geneva" charset="0"/>
-              </a:defRPr>
-            </a:lvl1pPr>
-            <a:lvl2pPr marL="742950" indent="-285750">
-              <a:defRPr>
-                <a:solidFill>
-                  <a:schemeClr val="tx1"/>
-                </a:solidFill>
-                <a:latin typeface="Calibri" charset="0"/>
-                <a:ea typeface="Geneva" charset="0"/>
-              </a:defRPr>
-            </a:lvl2pPr>
-            <a:lvl3pPr marL="1143000" indent="-228600">
-              <a:defRPr>
-                <a:solidFill>
-                  <a:schemeClr val="tx1"/>
-                </a:solidFill>
-                <a:latin typeface="Calibri" charset="0"/>
-                <a:ea typeface="Geneva" charset="0"/>
-              </a:defRPr>
-            </a:lvl3pPr>
-            <a:lvl4pPr marL="1600200" indent="-228600">
-              <a:defRPr>
-                <a:solidFill>
-                  <a:schemeClr val="tx1"/>
-                </a:solidFill>
-                <a:latin typeface="Calibri" charset="0"/>
-                <a:ea typeface="Geneva" charset="0"/>
-              </a:defRPr>
-            </a:lvl4pPr>
-            <a:lvl5pPr marL="2057400" indent="-228600">
-              <a:defRPr>
-                <a:solidFill>
-                  <a:schemeClr val="tx1"/>
-                </a:solidFill>
-                <a:latin typeface="Calibri" charset="0"/>
-                <a:ea typeface="Geneva" charset="0"/>
-              </a:defRPr>
-            </a:lvl5pPr>
-            <a:lvl6pPr marL="2514600" indent="-228600" fontAlgn="base">
-              <a:spcBef>
-                <a:spcPct val="0"/>
-              </a:spcBef>
-              <a:spcAft>
-                <a:spcPct val="0"/>
-              </a:spcAft>
-              <a:defRPr>
-                <a:solidFill>
-                  <a:schemeClr val="tx1"/>
-                </a:solidFill>
-                <a:latin typeface="Calibri" charset="0"/>
-                <a:ea typeface="Geneva" charset="0"/>
-              </a:defRPr>
-            </a:lvl6pPr>
-            <a:lvl7pPr marL="2971800" indent="-228600" fontAlgn="base">
-              <a:spcBef>
-                <a:spcPct val="0"/>
-              </a:spcBef>
-              <a:spcAft>
-                <a:spcPct val="0"/>
-              </a:spcAft>
-              <a:defRPr>
-                <a:solidFill>
-                  <a:schemeClr val="tx1"/>
-                </a:solidFill>
-                <a:latin typeface="Calibri" charset="0"/>
-                <a:ea typeface="Geneva" charset="0"/>
-              </a:defRPr>
-            </a:lvl7pPr>
-            <a:lvl8pPr marL="3429000" indent="-228600" fontAlgn="base">
-              <a:spcBef>
-                <a:spcPct val="0"/>
-              </a:spcBef>
-              <a:spcAft>
-                <a:spcPct val="0"/>
-              </a:spcAft>
-              <a:defRPr>
-                <a:solidFill>
-                  <a:schemeClr val="tx1"/>
-                </a:solidFill>
-                <a:latin typeface="Calibri" charset="0"/>
-                <a:ea typeface="Geneva" charset="0"/>
-              </a:defRPr>
-            </a:lvl8pPr>
-            <a:lvl9pPr marL="3886200" indent="-228600" fontAlgn="base">
-              <a:spcBef>
-                <a:spcPct val="0"/>
-              </a:spcBef>
-              <a:spcAft>
-                <a:spcPct val="0"/>
-              </a:spcAft>
-              <a:defRPr>
-                <a:solidFill>
-                  <a:schemeClr val="tx1"/>
-                </a:solidFill>
-                <a:latin typeface="Calibri" charset="0"/>
-                <a:ea typeface="Geneva" charset="0"/>
-              </a:defRPr>
-            </a:lvl9pPr>
-          </a:lstStyle>
-          <a:p>
-            <a:r>
-              <a:rPr lang="en-US" sz="2400" dirty="0"/>
-              <a:t>Amplify</a:t>
-            </a:r>
-          </a:p>
-        </p:txBody>
-      </p:sp>
-      <p:sp>
-        <p:nvSpPr>
-          <p:cNvPr id="38" name="Rounded Rectangle 37"/>
-          <p:cNvSpPr/>
-          <p:nvPr/>
-        </p:nvSpPr>
-        <p:spPr>
-          <a:xfrm>
-            <a:off x="2973452" y="276956"/>
-            <a:ext cx="1207157" cy="988733"/>
-          </a:xfrm>
-          <a:prstGeom prst="roundRect">
-            <a:avLst/>
-          </a:prstGeom>
-          <a:gradFill>
-            <a:gsLst>
-              <a:gs pos="0">
-                <a:srgbClr val="F9FFB3"/>
-              </a:gs>
-              <a:gs pos="100000">
-                <a:schemeClr val="bg1"/>
-              </a:gs>
-            </a:gsLst>
-          </a:gradFill>
-          <a:ln>
-            <a:solidFill>
-              <a:schemeClr val="accent6">
-                <a:lumMod val="60000"/>
-                <a:lumOff val="40000"/>
-              </a:schemeClr>
-            </a:solidFill>
-          </a:ln>
-        </p:spPr>
-        <p:style>
-          <a:lnRef idx="1">
-            <a:schemeClr val="accent1"/>
-          </a:lnRef>
-          <a:fillRef idx="3">
-            <a:schemeClr val="accent1"/>
-          </a:fillRef>
-          <a:effectRef idx="2">
-            <a:schemeClr val="accent1"/>
-          </a:effectRef>
-          <a:fontRef idx="minor">
-            <a:schemeClr val="lt1"/>
-          </a:fontRef>
-        </p:style>
-        <p:txBody>
-          <a:bodyPr anchor="ctr"/>
-          <a:lstStyle/>
-          <a:p>
-            <a:pPr algn="ctr" fontAlgn="auto">
-              <a:spcBef>
-                <a:spcPts val="0"/>
-              </a:spcBef>
-              <a:spcAft>
-                <a:spcPts val="0"/>
-              </a:spcAft>
-              <a:defRPr/>
-            </a:pPr>
-            <a:r>
-              <a:rPr lang="en-US" sz="1400" b="1" dirty="0" smtClean="0">
-                <a:solidFill>
-                  <a:srgbClr val="000000"/>
-                </a:solidFill>
-              </a:rPr>
-              <a:t>2. Identify Barriers and Potential Solutions</a:t>
-            </a:r>
-            <a:endParaRPr lang="en-US" sz="1400" dirty="0">
-              <a:solidFill>
-                <a:srgbClr val="000000"/>
-              </a:solidFill>
-            </a:endParaRPr>
-          </a:p>
-        </p:txBody>
-      </p:sp>
-      <p:sp>
-        <p:nvSpPr>
-          <p:cNvPr id="39" name="Right Arrow 38"/>
-          <p:cNvSpPr/>
-          <p:nvPr/>
-        </p:nvSpPr>
-        <p:spPr>
-          <a:xfrm rot="13565409">
-            <a:off x="7048308" y="1304591"/>
-            <a:ext cx="636342" cy="227161"/>
-          </a:xfrm>
-          <a:prstGeom prst="rightArrow">
-            <a:avLst/>
-          </a:prstGeom>
-        </p:spPr>
-        <p:style>
-          <a:lnRef idx="1">
-            <a:schemeClr val="accent1"/>
-          </a:lnRef>
-          <a:fillRef idx="3">
-            <a:schemeClr val="accent1"/>
-          </a:fillRef>
-          <a:effectRef idx="2">
-            <a:schemeClr val="accent1"/>
-          </a:effectRef>
-          <a:fontRef idx="minor">
-            <a:schemeClr val="lt1"/>
-          </a:fontRef>
-        </p:style>
-        <p:txBody>
-          <a:bodyPr anchor="ctr"/>
-          <a:lstStyle/>
-          <a:p>
-            <a:pPr algn="ctr" fontAlgn="auto">
-              <a:spcBef>
-                <a:spcPts val="0"/>
-              </a:spcBef>
-              <a:spcAft>
-                <a:spcPts val="0"/>
-              </a:spcAft>
-              <a:defRPr/>
-            </a:pPr>
-            <a:endParaRPr lang="en-US"/>
-          </a:p>
-        </p:txBody>
-      </p:sp>
-      <p:sp>
-        <p:nvSpPr>
-          <p:cNvPr id="40" name="TextBox 15"/>
-          <p:cNvSpPr txBox="1">
-            <a:spLocks noChangeArrowheads="1"/>
-          </p:cNvSpPr>
-          <p:nvPr/>
-        </p:nvSpPr>
-        <p:spPr bwMode="auto">
-          <a:xfrm>
-            <a:off x="5603150" y="1929865"/>
-            <a:ext cx="1217085" cy="461665"/>
-          </a:xfrm>
-          <a:prstGeom prst="rect">
-            <a:avLst/>
-          </a:prstGeom>
-          <a:solidFill>
-            <a:schemeClr val="bg1"/>
-          </a:solidFill>
-          <a:ln>
-            <a:noFill/>
-          </a:ln>
-          <a:extLst>
-            <a:ext uri="{91240B29-F687-4F45-9708-019B960494DF}">
-              <a14:hiddenLine xmlns:a14="http://schemas.microsoft.com/office/drawing/2010/main" w="9525">
-                <a:solidFill>
-                  <a:srgbClr val="000000"/>
-                </a:solidFill>
-                <a:miter lim="800000"/>
-                <a:headEnd/>
-                <a:tailEnd/>
-              </a14:hiddenLine>
-            </a:ext>
-          </a:extLst>
-        </p:spPr>
-        <p:txBody>
-          <a:bodyPr wrap="square">
-            <a:spAutoFit/>
-          </a:bodyPr>
-          <a:lstStyle>
-            <a:lvl1pPr>
-              <a:defRPr>
-                <a:solidFill>
-                  <a:schemeClr val="tx1"/>
-                </a:solidFill>
-                <a:latin typeface="Calibri" charset="0"/>
-                <a:ea typeface="Geneva" charset="0"/>
-                <a:cs typeface="Geneva" charset="0"/>
-              </a:defRPr>
-            </a:lvl1pPr>
-            <a:lvl2pPr marL="742950" indent="-285750">
-              <a:defRPr>
-                <a:solidFill>
-                  <a:schemeClr val="tx1"/>
-                </a:solidFill>
-                <a:latin typeface="Calibri" charset="0"/>
-                <a:ea typeface="Geneva" charset="0"/>
-              </a:defRPr>
-            </a:lvl2pPr>
-            <a:lvl3pPr marL="1143000" indent="-228600">
-              <a:defRPr>
-                <a:solidFill>
-                  <a:schemeClr val="tx1"/>
-                </a:solidFill>
-                <a:latin typeface="Calibri" charset="0"/>
-                <a:ea typeface="Geneva" charset="0"/>
-              </a:defRPr>
-            </a:lvl3pPr>
-            <a:lvl4pPr marL="1600200" indent="-228600">
-              <a:defRPr>
-                <a:solidFill>
-                  <a:schemeClr val="tx1"/>
-                </a:solidFill>
-                <a:latin typeface="Calibri" charset="0"/>
-                <a:ea typeface="Geneva" charset="0"/>
-              </a:defRPr>
-            </a:lvl4pPr>
-            <a:lvl5pPr marL="2057400" indent="-228600">
-              <a:defRPr>
-                <a:solidFill>
-                  <a:schemeClr val="tx1"/>
-                </a:solidFill>
-                <a:latin typeface="Calibri" charset="0"/>
-                <a:ea typeface="Geneva" charset="0"/>
-              </a:defRPr>
-            </a:lvl5pPr>
-            <a:lvl6pPr marL="2514600" indent="-228600" fontAlgn="base">
-              <a:spcBef>
-                <a:spcPct val="0"/>
-              </a:spcBef>
-              <a:spcAft>
-                <a:spcPct val="0"/>
-              </a:spcAft>
-              <a:defRPr>
-                <a:solidFill>
-                  <a:schemeClr val="tx1"/>
-                </a:solidFill>
-                <a:latin typeface="Calibri" charset="0"/>
-                <a:ea typeface="Geneva" charset="0"/>
-              </a:defRPr>
-            </a:lvl6pPr>
-            <a:lvl7pPr marL="2971800" indent="-228600" fontAlgn="base">
-              <a:spcBef>
-                <a:spcPct val="0"/>
-              </a:spcBef>
-              <a:spcAft>
-                <a:spcPct val="0"/>
-              </a:spcAft>
-              <a:defRPr>
-                <a:solidFill>
-                  <a:schemeClr val="tx1"/>
-                </a:solidFill>
-                <a:latin typeface="Calibri" charset="0"/>
-                <a:ea typeface="Geneva" charset="0"/>
-              </a:defRPr>
-            </a:lvl7pPr>
-            <a:lvl8pPr marL="3429000" indent="-228600" fontAlgn="base">
-              <a:spcBef>
-                <a:spcPct val="0"/>
-              </a:spcBef>
-              <a:spcAft>
-                <a:spcPct val="0"/>
-              </a:spcAft>
-              <a:defRPr>
-                <a:solidFill>
-                  <a:schemeClr val="tx1"/>
-                </a:solidFill>
-                <a:latin typeface="Calibri" charset="0"/>
-                <a:ea typeface="Geneva" charset="0"/>
-              </a:defRPr>
-            </a:lvl8pPr>
-            <a:lvl9pPr marL="3886200" indent="-228600" fontAlgn="base">
-              <a:spcBef>
-                <a:spcPct val="0"/>
-              </a:spcBef>
-              <a:spcAft>
-                <a:spcPct val="0"/>
-              </a:spcAft>
-              <a:defRPr>
-                <a:solidFill>
-                  <a:schemeClr val="tx1"/>
-                </a:solidFill>
-                <a:latin typeface="Calibri" charset="0"/>
-                <a:ea typeface="Geneva" charset="0"/>
-              </a:defRPr>
-            </a:lvl9pPr>
-          </a:lstStyle>
-          <a:p>
-            <a:r>
-              <a:rPr lang="en-US" sz="2400" dirty="0"/>
-              <a:t>Develop</a:t>
-            </a:r>
-          </a:p>
-        </p:txBody>
-      </p:sp>
-      <p:pic>
-        <p:nvPicPr>
-          <p:cNvPr id="23" name="Picture 17" descr="OCEPLegend.png"/>
-          <p:cNvPicPr>
-            <a:picLocks noChangeAspect="1"/>
-          </p:cNvPicPr>
-          <p:nvPr/>
-        </p:nvPicPr>
-        <p:blipFill>
-          <a:blip r:embed="rId4">
-            <a:extLst>
-              <a:ext uri="{28A0092B-C50C-407E-A947-70E740481C1C}">
-                <a14:useLocalDpi xmlns:a14="http://schemas.microsoft.com/office/drawing/2010/main" val="0"/>
-              </a:ext>
-            </a:extLst>
-          </a:blip>
-          <a:srcRect/>
-          <a:stretch>
-            <a:fillRect/>
-          </a:stretch>
-        </p:blipFill>
-        <p:spPr bwMode="auto">
-          <a:xfrm>
-            <a:off x="7049560" y="3599924"/>
-            <a:ext cx="2012950" cy="1370012"/>
-          </a:xfrm>
-          <a:prstGeom prst="rect">
-            <a:avLst/>
-          </a:prstGeom>
-          <a:noFill/>
-          <a:ln>
-            <a:noFill/>
-          </a:ln>
-          <a:extLst>
-            <a:ext uri="{909E8E84-426E-40DD-AFC4-6F175D3DCCD1}">
-              <a14:hiddenFill xmlns:a14="http://schemas.microsoft.com/office/drawing/2010/main">
-                <a:solidFill>
-                  <a:srgbClr val="FFFFFF"/>
-                </a:solidFill>
-              </a14:hiddenFill>
-            </a:ext>
-            <a:ext uri="{91240B29-F687-4F45-9708-019B960494DF}">
-              <a14:hiddenLine xmlns:a14="http://schemas.microsoft.com/office/drawing/2010/main" w="9525">
-                <a:solidFill>
-                  <a:srgbClr val="000000"/>
-                </a:solidFill>
-                <a:miter lim="800000"/>
-                <a:headEnd/>
-                <a:tailEnd/>
-              </a14:hiddenLine>
-            </a:ext>
-          </a:extLst>
-        </p:spPr>
-      </p:pic>
-      <p:sp>
-        <p:nvSpPr>
-          <p:cNvPr id="4" name="Rectangle 3"/>
-          <p:cNvSpPr/>
-          <p:nvPr/>
-        </p:nvSpPr>
-        <p:spPr>
-          <a:xfrm>
-            <a:off x="-6349" y="5088470"/>
-            <a:ext cx="9154764" cy="1493200"/>
-          </a:xfrm>
-          <a:prstGeom prst="rect">
-            <a:avLst/>
-          </a:prstGeom>
-          <a:solidFill>
-            <a:srgbClr val="2A81C4"/>
-          </a:solidFill>
-          <a:ln>
-            <a:noFill/>
-          </a:ln>
-          <a:effectLst/>
-        </p:spPr>
-        <p:style>
-          <a:lnRef idx="1">
-            <a:schemeClr val="accent1"/>
-          </a:lnRef>
-          <a:fillRef idx="3">
-            <a:schemeClr val="accent1"/>
-          </a:fillRef>
-          <a:effectRef idx="2">
-            <a:schemeClr val="accent1"/>
-          </a:effectRef>
-          <a:fontRef idx="minor">
-            <a:schemeClr val="lt1"/>
-          </a:fontRef>
-        </p:style>
-        <p:txBody>
           <a:bodyPr lIns="182880" tIns="182880" rtlCol="0" anchor="t" anchorCtr="0"/>
           <a:lstStyle/>
           <a:p>
@@ -8090,10 +6877,49 @@
           </a:p>
         </p:txBody>
       </p:sp>
+      <p:pic>
+        <p:nvPicPr>
+          <p:cNvPr id="41" name="Picture 40"/>
+          <p:cNvPicPr/>
+          <p:nvPr/>
+        </p:nvPicPr>
+        <p:blipFill>
+          <a:blip r:embed="rId3">
+            <a:extLst>
+              <a:ext uri="{28A0092B-C50C-407E-A947-70E740481C1C}">
+                <a14:useLocalDpi xmlns:a14="http://schemas.microsoft.com/office/drawing/2010/main" val="0"/>
+              </a:ext>
+            </a:extLst>
+          </a:blip>
+          <a:stretch>
+            <a:fillRect/>
+          </a:stretch>
+        </p:blipFill>
+        <p:spPr bwMode="auto">
+          <a:xfrm>
+            <a:off x="172742" y="684647"/>
+            <a:ext cx="8854639" cy="3502342"/>
+          </a:xfrm>
+          <a:prstGeom prst="rect">
+            <a:avLst/>
+          </a:prstGeom>
+          <a:solidFill>
+            <a:schemeClr val="accent1">
+              <a:lumMod val="40000"/>
+              <a:lumOff val="60000"/>
+            </a:schemeClr>
+          </a:solidFill>
+          <a:ln>
+            <a:noFill/>
+          </a:ln>
+          <a:effectLst/>
+          <a:extLst/>
+        </p:spPr>
+      </p:pic>
     </p:spTree>
     <p:extLst>
       <p:ext uri="{BB962C8B-B14F-4D97-AF65-F5344CB8AC3E}">
-        <p14:creationId xmlns:p14="http://schemas.microsoft.com/office/powerpoint/2010/main" val="1180472509"/>
+        <p14:creationId xmlns:p14="http://schemas.microsoft.com/office/powerpoint/2010/main" val="3631481406"/>
       </p:ext>
     </p:extLst>
   </p:cSld>
@@ -8103,71 +6929,9 @@
   <p:timing>
     <p:tnLst>
       <p:par>
-        <p:cTn id="1" dur="indefinite" restart="never" nodeType="tmRoot">
-          <p:childTnLst>
-            <p:seq concurrent="1" nextAc="seek">
-              <p:cTn id="2" dur="indefinite" nodeType="mainSeq">
-                <p:childTnLst>
-                  <p:par>
-                    <p:cTn id="3" fill="hold">
-                      <p:stCondLst>
-                        <p:cond delay="indefinite"/>
-                      </p:stCondLst>
-                      <p:childTnLst>
-                        <p:par>
-                          <p:cTn id="4" fill="hold">
-                            <p:stCondLst>
-                              <p:cond delay="0"/>
-                            </p:stCondLst>
-                            <p:childTnLst>
-                              <p:par>
-                                <p:cTn id="5" presetID="6" presetClass="emph" presetSubtype="0" fill="hold" grpId="0" nodeType="clickEffect">
-                                  <p:stCondLst>
-                                    <p:cond delay="0"/>
-                                  </p:stCondLst>
-                                  <p:childTnLst>
-                                    <p:animScale>
-                                      <p:cBhvr>
-                                        <p:cTn id="6" dur="2000" fill="hold"/>
-                                        <p:tgtEl>
-                                          <p:spTgt spid="29"/>
-                                        </p:tgtEl>
-                                      </p:cBhvr>
-                                      <p:by x="150000" y="150000"/>
-                                    </p:animScale>
-                                  </p:childTnLst>
-                                </p:cTn>
-                              </p:par>
-                            </p:childTnLst>
-                          </p:cTn>
-                        </p:par>
-                      </p:childTnLst>
-                    </p:cTn>
-                  </p:par>
-                </p:childTnLst>
-              </p:cTn>
-              <p:prevCondLst>
-                <p:cond evt="onPrev" delay="0">
-                  <p:tgtEl>
-                    <p:sldTgt/>
-                  </p:tgtEl>
-                </p:cond>
-              </p:prevCondLst>
-              <p:nextCondLst>
-                <p:cond evt="onNext" delay="0">
-                  <p:tgtEl>
-                    <p:sldTgt/>
-                  </p:tgtEl>
-                </p:cond>
-              </p:nextCondLst>
-            </p:seq>
-          </p:childTnLst>
-        </p:cTn>
+        <p:cTn id="1" dur="indefinite" restart="never" nodeType="tmRoot"/>
       </p:par>
     </p:tnLst>
-    <p:bldLst>
-      <p:bldP spid="29" grpId="0" animBg="1"/>
-    </p:bldLst>
   </p:timing>
 </p:sld>
 </file>
@@ -8212,8 +6976,12 @@
           <a:lstStyle/>
           <a:p>
             <a:r>
+              <a:rPr lang="en-US" dirty="0"/>
+              <a:t>Twitch Plays </a:t>
+            </a:r>
+            <a:r>
               <a:rPr lang="en-US" dirty="0" smtClean="0"/>
-              <a:t>WRESTORE</a:t>
+              <a:t>Pokémon</a:t>
             </a:r>
             <a:endParaRPr lang="en-US" dirty="0"/>
           </a:p>
@@ -8231,8 +6999,8 @@
         </p:nvSpPr>
         <p:spPr>
           <a:xfrm>
-            <a:off x="457200" y="1143000"/>
-            <a:ext cx="3770416" cy="5257800"/>
+            <a:off x="457200" y="4871150"/>
+            <a:ext cx="8566484" cy="1658824"/>
           </a:xfrm>
         </p:spPr>
         <p:txBody>
@@ -8241,156 +7009,92 @@
           </a:bodyPr>
           <a:lstStyle/>
           <a:p>
-            <a:pPr>
+            <a:pPr marL="457200" lvl="1" indent="0">
               <a:spcBef>
                 <a:spcPts val="0"/>
               </a:spcBef>
+              <a:buNone/>
             </a:pPr>
             <a:r>
-              <a:rPr lang="en-US" dirty="0" err="1" smtClean="0"/>
-              <a:t>Meghna</a:t>
-            </a:r>
-            <a:r>
-              <a:rPr lang="en-US" dirty="0" smtClean="0"/>
+              <a:rPr lang="en-US" sz="2400" dirty="0">
+                <a:hlinkClick r:id="rId3"/>
+              </a:rPr>
+              <a:t>http://</a:t>
+            </a:r>
+            <a:r>
+              <a:rPr lang="en-US" sz="2400" dirty="0" smtClean="0">
+                <a:hlinkClick r:id="rId3"/>
+              </a:rPr>
+              <a:t>www.polygon.com/2014/2/14/5411790/twitch-plays-pokemon-creator-interview-twitchplayspokemon</a:t>
+            </a:r>
+            <a:endParaRPr lang="en-US" sz="2400" dirty="0" smtClean="0"/>
+          </a:p>
+          <a:p>
+            <a:pPr marL="457200" lvl="1" indent="0">
+              <a:spcBef>
+                <a:spcPts val="0"/>
+              </a:spcBef>
+              <a:buNone/>
+            </a:pPr>
+            <a:endParaRPr lang="en-US" sz="2400" dirty="0" smtClean="0"/>
+          </a:p>
+          <a:p>
+            <a:pPr marL="457200" lvl="1" indent="0">
+              <a:spcBef>
+                <a:spcPts val="0"/>
+              </a:spcBef>
+              <a:buNone/>
+            </a:pPr>
+            <a:r>
+              <a:rPr lang="en-US" sz="2400" dirty="0">
+                <a:hlinkClick r:id="rId4"/>
+              </a:rPr>
+              <a:t>http://</a:t>
+            </a:r>
+            <a:r>
+              <a:rPr lang="en-US" sz="2400" dirty="0" smtClean="0">
+                <a:hlinkClick r:id="rId4"/>
+              </a:rPr>
+              <a:t>en.wikipedia.org/wiki/Twitch_Plays_Pok%C3%A9mon</a:t>
+            </a:r>
+            <a:r>
+              <a:rPr lang="en-US" sz="2400" dirty="0" smtClean="0"/>
               <a:t> </a:t>
             </a:r>
-            <a:r>
-              <a:rPr lang="en-US" dirty="0" err="1" smtClean="0"/>
-              <a:t>Babbar-Sebens</a:t>
-            </a:r>
-            <a:endParaRPr lang="en-US" dirty="0"/>
-          </a:p>
-          <a:p>
-            <a:pPr lvl="1">
-              <a:spcBef>
-                <a:spcPts val="0"/>
-              </a:spcBef>
-            </a:pPr>
-            <a:r>
-              <a:rPr lang="en-US" dirty="0" smtClean="0"/>
-              <a:t>Oregon State University</a:t>
-            </a:r>
-          </a:p>
-          <a:p>
-            <a:pPr lvl="1">
-              <a:spcBef>
-                <a:spcPts val="0"/>
-              </a:spcBef>
-            </a:pPr>
-            <a:r>
-              <a:rPr lang="en-US" dirty="0" smtClean="0"/>
-              <a:t>Indiana </a:t>
-            </a:r>
-            <a:r>
-              <a:rPr lang="en-US" dirty="0"/>
-              <a:t>University-Purdue University </a:t>
-            </a:r>
-            <a:r>
-              <a:rPr lang="en-US" dirty="0" smtClean="0"/>
-              <a:t>Indianapolis</a:t>
-            </a:r>
-          </a:p>
-          <a:p>
-            <a:pPr lvl="1">
-              <a:spcBef>
-                <a:spcPts val="0"/>
-              </a:spcBef>
-            </a:pPr>
-            <a:r>
-              <a:rPr lang="en-US" dirty="0"/>
-              <a:t>the Wetlands Institute in New </a:t>
-            </a:r>
-            <a:r>
-              <a:rPr lang="en-US" dirty="0" smtClean="0"/>
-              <a:t>Jersey</a:t>
-            </a:r>
-            <a:endParaRPr lang="en-US" dirty="0"/>
-          </a:p>
-          <a:p>
-            <a:pPr lvl="1">
-              <a:spcBef>
-                <a:spcPts val="0"/>
-              </a:spcBef>
-            </a:pPr>
-            <a:r>
-              <a:rPr lang="en-US" dirty="0" smtClean="0"/>
-              <a:t>EPA</a:t>
-            </a:r>
-            <a:endParaRPr lang="en-US" dirty="0"/>
+            <a:endParaRPr lang="en-US" sz="2400" dirty="0"/>
           </a:p>
         </p:txBody>
       </p:sp>
       <p:pic>
         <p:nvPicPr>
-          <p:cNvPr id="4" name="Picture 2" descr="C:\Users\rayi\Dropbox\WSSI Conceptualization\SESYNC\Venture\Jan 21-23 2014\Open Source\WRESTORE.PNG"/>
+          <p:cNvPr id="6" name="Picture 5"/>
           <p:cNvPicPr>
-            <a:picLocks noChangeAspect="1" noChangeArrowheads="1"/>
+            <a:picLocks noChangeAspect="1"/>
           </p:cNvPicPr>
           <p:nvPr/>
         </p:nvPicPr>
         <p:blipFill>
-          <a:blip r:embed="rId3" cstate="print">
+          <a:blip r:embed="rId5">
             <a:extLst>
               <a:ext uri="{28A0092B-C50C-407E-A947-70E740481C1C}">
                 <a14:useLocalDpi xmlns:a14="http://schemas.microsoft.com/office/drawing/2010/main" val="0"/>
               </a:ext>
             </a:extLst>
           </a:blip>
-          <a:srcRect/>
           <a:stretch>
             <a:fillRect/>
           </a:stretch>
         </p:blipFill>
-        <p:spPr bwMode="auto">
-          <a:xfrm>
-            <a:off x="4529002" y="1065552"/>
-            <a:ext cx="4064603" cy="5079927"/>
+        <p:spPr>
+          <a:xfrm>
+            <a:off x="1280160" y="998621"/>
+            <a:ext cx="6583680" cy="3703320"/>
           </a:xfrm>
           <a:prstGeom prst="rect">
             <a:avLst/>
           </a:prstGeom>
-          <a:noFill/>
-          <a:extLst>
-            <a:ext uri="{909E8E84-426E-40DD-AFC4-6F175D3DCCD1}">
-              <a14:hiddenFill xmlns:a14="http://schemas.microsoft.com/office/drawing/2010/main">
-                <a:solidFill>
-                  <a:srgbClr val="FFFFFF"/>
-                </a:solidFill>
-              </a14:hiddenFill>
-            </a:ext>
-          </a:extLst>
         </p:spPr>
       </p:pic>
-      <p:sp>
-        <p:nvSpPr>
-          <p:cNvPr id="5" name="TextBox 4"/>
-          <p:cNvSpPr txBox="1"/>
-          <p:nvPr/>
-        </p:nvSpPr>
-        <p:spPr>
-          <a:xfrm>
-            <a:off x="5217120" y="6145479"/>
-            <a:ext cx="2688365" cy="369332"/>
-          </a:xfrm>
-          <a:prstGeom prst="rect">
-            <a:avLst/>
-          </a:prstGeom>
-          <a:noFill/>
-        </p:spPr>
-        <p:txBody>
-          <a:bodyPr wrap="none" rtlCol="0">
-            <a:spAutoFit/>
-          </a:bodyPr>
-          <a:lstStyle/>
-          <a:p>
-            <a:pPr algn="ctr"/>
-            <a:r>
-              <a:rPr lang="en-US" dirty="0"/>
-              <a:t>http://wrestore.iupui.edu/</a:t>
-            </a:r>
-          </a:p>
-        </p:txBody>
-      </p:sp>
     </p:spTree>
     <p:extLst>
       <p:ext uri="{BB962C8B-B14F-4D97-AF65-F5344CB8AC3E}">
@@ -8451,8 +7155,12 @@
           <a:lstStyle/>
           <a:p>
             <a:r>
+              <a:rPr lang="en-US" dirty="0"/>
+              <a:t>Crowdsourcing Lightning </a:t>
+            </a:r>
+            <a:r>
               <a:rPr lang="en-US" dirty="0" smtClean="0"/>
-              <a:t>NCDS</a:t>
+              <a:t>Strikes</a:t>
             </a:r>
             <a:endParaRPr lang="en-US" dirty="0"/>
           </a:p>
@@ -8470,8 +7178,8 @@
         </p:nvSpPr>
         <p:spPr>
           <a:xfrm>
-            <a:off x="457199" y="887679"/>
-            <a:ext cx="7962405" cy="5257800"/>
+            <a:off x="457200" y="5256161"/>
+            <a:ext cx="8566484" cy="928071"/>
           </a:xfrm>
         </p:spPr>
         <p:txBody>
@@ -8480,94 +7188,62 @@
           </a:bodyPr>
           <a:lstStyle/>
           <a:p>
-            <a:pPr>
+            <a:pPr marL="457200" lvl="1" indent="0">
               <a:spcBef>
                 <a:spcPts val="0"/>
               </a:spcBef>
+              <a:buNone/>
             </a:pPr>
             <a:r>
-              <a:rPr lang="en-US" dirty="0" smtClean="0"/>
-              <a:t>Open Data</a:t>
-            </a:r>
-            <a:endParaRPr lang="en-US" dirty="0"/>
-          </a:p>
-        </p:txBody>
-      </p:sp>
-      <p:sp>
-        <p:nvSpPr>
-          <p:cNvPr id="5" name="TextBox 4"/>
-          <p:cNvSpPr txBox="1"/>
-          <p:nvPr/>
-        </p:nvSpPr>
-        <p:spPr>
-          <a:xfrm>
-            <a:off x="2382042" y="6021980"/>
-            <a:ext cx="4379917" cy="369332"/>
-          </a:xfrm>
-          <a:prstGeom prst="rect">
-            <a:avLst/>
-          </a:prstGeom>
-          <a:noFill/>
-        </p:spPr>
-        <p:txBody>
-          <a:bodyPr wrap="none" rtlCol="0">
-            <a:spAutoFit/>
-          </a:bodyPr>
-          <a:lstStyle/>
-          <a:p>
-            <a:pPr algn="ctr"/>
-            <a:r>
-              <a:rPr lang="en-US" dirty="0"/>
-              <a:t>http://data2discovery.org/data-observatory/</a:t>
-            </a:r>
+              <a:rPr lang="en-US" sz="2400" dirty="0">
+                <a:hlinkClick r:id="rId3"/>
+              </a:rPr>
+              <a:t>http://www.citylab.com/weather/2014/07/crowdsourcing-lightning-strikes-actually-works-pretty-well/375359</a:t>
+            </a:r>
+            <a:r>
+              <a:rPr lang="en-US" sz="2400" dirty="0" smtClean="0">
+                <a:hlinkClick r:id="rId3"/>
+              </a:rPr>
+              <a:t>/</a:t>
+            </a:r>
+            <a:endParaRPr lang="en-US" sz="2400" dirty="0" smtClean="0"/>
           </a:p>
         </p:txBody>
       </p:sp>
       <p:pic>
         <p:nvPicPr>
-          <p:cNvPr id="2050" name="Picture 2" descr="C:\Users\rayi\Dropbox\WSSI Conceptualization\SESYNC\Venture\Jan 21-23 2014\Open Source\NCDS.PNG"/>
+          <p:cNvPr id="4" name="Picture 3"/>
           <p:cNvPicPr>
-            <a:picLocks noChangeAspect="1" noChangeArrowheads="1"/>
+            <a:picLocks noChangeAspect="1"/>
           </p:cNvPicPr>
           <p:nvPr/>
         </p:nvPicPr>
         <p:blipFill>
-          <a:blip r:embed="rId3">
+          <a:blip r:embed="rId4">
             <a:extLst>
               <a:ext uri="{28A0092B-C50C-407E-A947-70E740481C1C}">
                 <a14:useLocalDpi xmlns:a14="http://schemas.microsoft.com/office/drawing/2010/main" val="0"/>
               </a:ext>
             </a:extLst>
           </a:blip>
-          <a:srcRect/>
           <a:stretch>
             <a:fillRect/>
           </a:stretch>
         </p:blipFill>
-        <p:spPr bwMode="auto">
-          <a:xfrm>
-            <a:off x="1462406" y="1514678"/>
-            <a:ext cx="6219189" cy="4500769"/>
+        <p:spPr>
+          <a:xfrm>
+            <a:off x="1564459" y="1058779"/>
+            <a:ext cx="6352320" cy="3978373"/>
           </a:xfrm>
           <a:prstGeom prst="rect">
             <a:avLst/>
           </a:prstGeom>
-          <a:noFill/>
-          <a:extLst>
-            <a:ext uri="{909E8E84-426E-40DD-AFC4-6F175D3DCCD1}">
-              <a14:hiddenFill xmlns:a14="http://schemas.microsoft.com/office/drawing/2010/main">
-                <a:solidFill>
-                  <a:srgbClr val="FFFFFF"/>
-                </a:solidFill>
-              </a14:hiddenFill>
-            </a:ext>
-          </a:extLst>
         </p:spPr>
       </p:pic>
     </p:spTree>
     <p:extLst>
       <p:ext uri="{BB962C8B-B14F-4D97-AF65-F5344CB8AC3E}">
-        <p14:creationId xmlns:p14="http://schemas.microsoft.com/office/powerpoint/2010/main" val="1714641389"/>
+        <p14:creationId xmlns:p14="http://schemas.microsoft.com/office/powerpoint/2010/main" val="3541838116"/>
       </p:ext>
     </p:extLst>
   </p:cSld>
@@ -8624,12 +7300,8 @@
           <a:lstStyle/>
           <a:p>
             <a:r>
-              <a:rPr lang="en-US" dirty="0" smtClean="0"/>
-              <a:t>Take </a:t>
-            </a:r>
-            <a:r>
               <a:rPr lang="en-US" dirty="0" err="1" smtClean="0"/>
-              <a:t>Aways</a:t>
+              <a:t>Folding@HOME</a:t>
             </a:r>
             <a:endParaRPr lang="en-US" dirty="0"/>
           </a:p>
@@ -8647,8 +7319,8 @@
         </p:nvSpPr>
         <p:spPr>
           <a:xfrm>
-            <a:off x="457200" y="1143000"/>
-            <a:ext cx="8503920" cy="5257800"/>
+            <a:off x="457200" y="4842948"/>
+            <a:ext cx="8566484" cy="1557852"/>
           </a:xfrm>
         </p:spPr>
         <p:txBody>
@@ -8657,108 +7329,99 @@
           </a:bodyPr>
           <a:lstStyle/>
           <a:p>
-            <a:pPr>
+            <a:pPr marL="457200" lvl="1" indent="0">
               <a:spcBef>
                 <a:spcPts val="0"/>
               </a:spcBef>
+              <a:buNone/>
             </a:pPr>
             <a:r>
-              <a:rPr lang="en-US" dirty="0" smtClean="0"/>
-              <a:t>Open Source mechanics works for more than just software, and with a variety of approaches</a:t>
-            </a:r>
-          </a:p>
-          <a:p>
-            <a:pPr lvl="1">
+              <a:rPr lang="en-US" sz="2400" dirty="0">
+                <a:hlinkClick r:id="rId3"/>
+              </a:rPr>
+              <a:t>http://folding.stanford.edu</a:t>
+            </a:r>
+            <a:r>
+              <a:rPr lang="en-US" sz="2400" dirty="0" smtClean="0">
+                <a:hlinkClick r:id="rId3"/>
+              </a:rPr>
+              <a:t>/</a:t>
+            </a:r>
+            <a:r>
+              <a:rPr lang="en-US" sz="2400" dirty="0" smtClean="0"/>
+              <a:t> </a:t>
+            </a:r>
+          </a:p>
+          <a:p>
+            <a:pPr marL="457200" lvl="1" indent="0">
               <a:spcBef>
                 <a:spcPts val="0"/>
               </a:spcBef>
+              <a:buNone/>
             </a:pPr>
-            <a:r>
-              <a:rPr lang="en-US" dirty="0" smtClean="0"/>
-              <a:t>Math, </a:t>
-            </a:r>
-            <a:r>
-              <a:rPr lang="en-US" dirty="0"/>
-              <a:t>Chess, Steam </a:t>
-            </a:r>
-            <a:r>
-              <a:rPr lang="en-US" dirty="0" smtClean="0"/>
-              <a:t>Engines</a:t>
-            </a:r>
-          </a:p>
-          <a:p>
-            <a:pPr lvl="1">
+            <a:endParaRPr lang="en-US" sz="2400" dirty="0" smtClean="0"/>
+          </a:p>
+          <a:p>
+            <a:pPr marL="457200" lvl="1" indent="0">
               <a:spcBef>
                 <a:spcPts val="0"/>
               </a:spcBef>
+              <a:buNone/>
             </a:pPr>
             <a:r>
-              <a:rPr lang="en-US" dirty="0" smtClean="0"/>
-              <a:t>Data, Research</a:t>
-            </a:r>
-          </a:p>
-          <a:p>
-            <a:pPr>
-              <a:spcBef>
-                <a:spcPts val="0"/>
-              </a:spcBef>
-            </a:pPr>
-            <a:r>
-              <a:rPr lang="en-US" dirty="0" smtClean="0"/>
-              <a:t>Amplification Effect: Create a framework where lots of little ideas can freely combine into one, or more, greater ideas</a:t>
-            </a:r>
-          </a:p>
-          <a:p>
-            <a:pPr lvl="1">
-              <a:spcBef>
-                <a:spcPts val="0"/>
-              </a:spcBef>
-            </a:pPr>
-            <a:r>
-              <a:rPr lang="en-US" dirty="0" smtClean="0"/>
-              <a:t>Innovation</a:t>
-            </a:r>
-          </a:p>
-          <a:p>
-            <a:pPr lvl="1">
-              <a:spcBef>
-                <a:spcPts val="0"/>
-              </a:spcBef>
-            </a:pPr>
-            <a:r>
-              <a:rPr lang="en-US" dirty="0" smtClean="0"/>
-              <a:t>Collaboration</a:t>
-            </a:r>
-          </a:p>
-          <a:p>
-            <a:pPr lvl="1">
-              <a:spcBef>
-                <a:spcPts val="0"/>
-              </a:spcBef>
-            </a:pPr>
-            <a:r>
-              <a:rPr lang="en-US" dirty="0" smtClean="0"/>
-              <a:t>Solutions to problems</a:t>
-            </a:r>
-          </a:p>
-          <a:p>
-            <a:pPr lvl="2">
-              <a:spcBef>
-                <a:spcPts val="0"/>
-              </a:spcBef>
-            </a:pPr>
-            <a:r>
-              <a:rPr lang="en-US" dirty="0" smtClean="0"/>
-              <a:t>From bug fixes to research solutions</a:t>
-            </a:r>
-            <a:endParaRPr lang="en-US" dirty="0"/>
-          </a:p>
-        </p:txBody>
-      </p:sp>
+              <a:rPr lang="en-US" sz="2400" dirty="0">
+                <a:hlinkClick r:id="rId4"/>
+              </a:rPr>
+              <a:t>http://</a:t>
+            </a:r>
+            <a:r>
+              <a:rPr lang="en-US" sz="2400" dirty="0" smtClean="0">
+                <a:hlinkClick r:id="rId4"/>
+              </a:rPr>
+              <a:t>www.crowdsourcing.org/site/foldinghome/foldingstanfordedu/3975</a:t>
+            </a:r>
+            <a:r>
+              <a:rPr lang="en-US" sz="2400" dirty="0"/>
+              <a:t> </a:t>
+            </a:r>
+            <a:endParaRPr lang="en-US" sz="2400" dirty="0" smtClean="0"/>
+          </a:p>
+        </p:txBody>
+      </p:sp>
+      <p:pic>
+        <p:nvPicPr>
+          <p:cNvPr id="5" name="Picture 4"/>
+          <p:cNvPicPr>
+            <a:picLocks noChangeAspect="1"/>
+          </p:cNvPicPr>
+          <p:nvPr/>
+        </p:nvPicPr>
+        <p:blipFill>
+          <a:blip r:embed="rId5" cstate="print">
+            <a:extLst>
+              <a:ext uri="{28A0092B-C50C-407E-A947-70E740481C1C}">
+                <a14:useLocalDpi xmlns:a14="http://schemas.microsoft.com/office/drawing/2010/main" val="0"/>
+              </a:ext>
+            </a:extLst>
+          </a:blip>
+          <a:stretch>
+            <a:fillRect/>
+          </a:stretch>
+        </p:blipFill>
+        <p:spPr>
+          <a:xfrm>
+            <a:off x="1422734" y="1019299"/>
+            <a:ext cx="6635415" cy="3732421"/>
+          </a:xfrm>
+          <a:prstGeom prst="rect">
+            <a:avLst/>
+          </a:prstGeom>
+        </p:spPr>
+      </p:pic>
     </p:spTree>
     <p:extLst>
       <p:ext uri="{BB962C8B-B14F-4D97-AF65-F5344CB8AC3E}">
-        <p14:creationId xmlns:p14="http://schemas.microsoft.com/office/powerpoint/2010/main" val="1552858488"/>
+        <p14:creationId xmlns:p14="http://schemas.microsoft.com/office/powerpoint/2010/main" val="1219173351"/>
       </p:ext>
     </p:extLst>
   </p:cSld>
@@ -8799,13 +7462,13 @@
             <a:spLocks noGrp="1"/>
           </p:cNvSpPr>
           <p:nvPr>
-            <p:ph type="ctrTitle"/>
+            <p:ph type="title"/>
           </p:nvPr>
         </p:nvSpPr>
         <p:spPr>
           <a:xfrm>
-            <a:off x="685800" y="2130425"/>
-            <a:ext cx="7772400" cy="2468871"/>
+            <a:off x="457200" y="0"/>
+            <a:ext cx="8229600" cy="1143000"/>
           </a:xfrm>
         </p:spPr>
         <p:txBody>
@@ -8816,19 +7479,313 @@
           <a:p>
             <a:r>
               <a:rPr lang="en-US" dirty="0" smtClean="0"/>
-              <a:t>END</a:t>
-            </a:r>
-            <a:br>
+              <a:t>NCDS</a:t>
+            </a:r>
+            <a:endParaRPr lang="en-US" dirty="0"/>
+          </a:p>
+        </p:txBody>
+      </p:sp>
+      <p:sp>
+        <p:nvSpPr>
+          <p:cNvPr id="3" name="Content Placeholder 2"/>
+          <p:cNvSpPr>
+            <a:spLocks noGrp="1"/>
+          </p:cNvSpPr>
+          <p:nvPr>
+            <p:ph idx="1"/>
+          </p:nvPr>
+        </p:nvSpPr>
+        <p:spPr>
+          <a:xfrm>
+            <a:off x="457199" y="887679"/>
+            <a:ext cx="7962405" cy="5257800"/>
+          </a:xfrm>
+        </p:spPr>
+        <p:txBody>
+          <a:bodyPr>
+            <a:noAutofit/>
+          </a:bodyPr>
+          <a:lstStyle/>
+          <a:p>
+            <a:pPr>
+              <a:spcBef>
+                <a:spcPts val="0"/>
+              </a:spcBef>
+            </a:pPr>
+            <a:r>
               <a:rPr lang="en-US" dirty="0" smtClean="0"/>
-            </a:br>
+              <a:t>Open Data</a:t>
+            </a:r>
             <a:endParaRPr lang="en-US" dirty="0"/>
           </a:p>
         </p:txBody>
       </p:sp>
+      <p:sp>
+        <p:nvSpPr>
+          <p:cNvPr id="5" name="TextBox 4"/>
+          <p:cNvSpPr txBox="1"/>
+          <p:nvPr/>
+        </p:nvSpPr>
+        <p:spPr>
+          <a:xfrm>
+            <a:off x="2382042" y="6021980"/>
+            <a:ext cx="4379917" cy="369332"/>
+          </a:xfrm>
+          <a:prstGeom prst="rect">
+            <a:avLst/>
+          </a:prstGeom>
+          <a:noFill/>
+        </p:spPr>
+        <p:txBody>
+          <a:bodyPr wrap="none" rtlCol="0">
+            <a:spAutoFit/>
+          </a:bodyPr>
+          <a:lstStyle/>
+          <a:p>
+            <a:pPr algn="ctr"/>
+            <a:r>
+              <a:rPr lang="en-US" dirty="0"/>
+              <a:t>http://data2discovery.org/data-observatory/</a:t>
+            </a:r>
+          </a:p>
+        </p:txBody>
+      </p:sp>
+      <p:pic>
+        <p:nvPicPr>
+          <p:cNvPr id="2050" name="Picture 2" descr="C:\Users\rayi\Dropbox\WSSI Conceptualization\SESYNC\Venture\Jan 21-23 2014\Open Source\NCDS.PNG"/>
+          <p:cNvPicPr>
+            <a:picLocks noChangeAspect="1" noChangeArrowheads="1"/>
+          </p:cNvPicPr>
+          <p:nvPr/>
+        </p:nvPicPr>
+        <p:blipFill>
+          <a:blip r:embed="rId3">
+            <a:extLst>
+              <a:ext uri="{28A0092B-C50C-407E-A947-70E740481C1C}">
+                <a14:useLocalDpi xmlns:a14="http://schemas.microsoft.com/office/drawing/2010/main" val="0"/>
+              </a:ext>
+            </a:extLst>
+          </a:blip>
+          <a:srcRect/>
+          <a:stretch>
+            <a:fillRect/>
+          </a:stretch>
+        </p:blipFill>
+        <p:spPr bwMode="auto">
+          <a:xfrm>
+            <a:off x="1462406" y="1514678"/>
+            <a:ext cx="6219189" cy="4500769"/>
+          </a:xfrm>
+          <a:prstGeom prst="rect">
+            <a:avLst/>
+          </a:prstGeom>
+          <a:noFill/>
+          <a:extLst>
+            <a:ext uri="{909E8E84-426E-40DD-AFC4-6F175D3DCCD1}">
+              <a14:hiddenFill xmlns:a14="http://schemas.microsoft.com/office/drawing/2010/main">
+                <a:solidFill>
+                  <a:srgbClr val="FFFFFF"/>
+                </a:solidFill>
+              </a14:hiddenFill>
+            </a:ext>
+          </a:extLst>
+        </p:spPr>
+      </p:pic>
     </p:spTree>
     <p:extLst>
       <p:ext uri="{BB962C8B-B14F-4D97-AF65-F5344CB8AC3E}">
-        <p14:creationId xmlns:p14="http://schemas.microsoft.com/office/powerpoint/2010/main" val="1024291177"/>
+        <p14:creationId xmlns:p14="http://schemas.microsoft.com/office/powerpoint/2010/main" val="1714641389"/>
+      </p:ext>
+    </p:extLst>
+  </p:cSld>
+  <p:clrMapOvr>
+    <a:masterClrMapping/>
+  </p:clrMapOvr>
+  <p:timing>
+    <p:tnLst>
+      <p:par>
+        <p:cTn id="1" dur="indefinite" restart="never" nodeType="tmRoot"/>
+      </p:par>
+    </p:tnLst>
+  </p:timing>
+</p:sld>
+</file>
+
+<file path=ppt/slides/slide19.xml><?xml version="1.0" encoding="utf-8"?>
+<p:sld xmlns:a="http://schemas.openxmlformats.org/drawingml/2006/main" xmlns:r="http://schemas.openxmlformats.org/officeDocument/2006/relationships" xmlns:p="http://schemas.openxmlformats.org/presentationml/2006/main">
+  <p:cSld>
+    <p:spTree>
+      <p:nvGrpSpPr>
+        <p:cNvPr id="1" name=""/>
+        <p:cNvGrpSpPr/>
+        <p:nvPr/>
+      </p:nvGrpSpPr>
+      <p:grpSpPr>
+        <a:xfrm>
+          <a:off x="0" y="0"/>
+          <a:ext cx="0" cy="0"/>
+          <a:chOff x="0" y="0"/>
+          <a:chExt cx="0" cy="0"/>
+        </a:xfrm>
+      </p:grpSpPr>
+      <p:sp>
+        <p:nvSpPr>
+          <p:cNvPr id="2" name="Title 1"/>
+          <p:cNvSpPr>
+            <a:spLocks noGrp="1"/>
+          </p:cNvSpPr>
+          <p:nvPr>
+            <p:ph type="title"/>
+          </p:nvPr>
+        </p:nvSpPr>
+        <p:spPr>
+          <a:xfrm>
+            <a:off x="457200" y="0"/>
+            <a:ext cx="8229600" cy="1143000"/>
+          </a:xfrm>
+        </p:spPr>
+        <p:txBody>
+          <a:bodyPr>
+            <a:normAutofit/>
+          </a:bodyPr>
+          <a:lstStyle/>
+          <a:p>
+            <a:r>
+              <a:rPr lang="en-US" dirty="0" smtClean="0"/>
+              <a:t>Take </a:t>
+            </a:r>
+            <a:r>
+              <a:rPr lang="en-US" dirty="0" err="1" smtClean="0"/>
+              <a:t>Aways</a:t>
+            </a:r>
+            <a:endParaRPr lang="en-US" dirty="0"/>
+          </a:p>
+        </p:txBody>
+      </p:sp>
+      <p:sp>
+        <p:nvSpPr>
+          <p:cNvPr id="3" name="Content Placeholder 2"/>
+          <p:cNvSpPr>
+            <a:spLocks noGrp="1"/>
+          </p:cNvSpPr>
+          <p:nvPr>
+            <p:ph idx="1"/>
+          </p:nvPr>
+        </p:nvSpPr>
+        <p:spPr>
+          <a:xfrm>
+            <a:off x="457200" y="1143000"/>
+            <a:ext cx="8503920" cy="5257800"/>
+          </a:xfrm>
+        </p:spPr>
+        <p:txBody>
+          <a:bodyPr>
+            <a:noAutofit/>
+          </a:bodyPr>
+          <a:lstStyle/>
+          <a:p>
+            <a:pPr>
+              <a:spcBef>
+                <a:spcPts val="0"/>
+              </a:spcBef>
+            </a:pPr>
+            <a:r>
+              <a:rPr lang="en-US" dirty="0" smtClean="0"/>
+              <a:t>Open Source mechanics works for more than just software, and with a variety of approaches</a:t>
+            </a:r>
+          </a:p>
+          <a:p>
+            <a:pPr lvl="1">
+              <a:spcBef>
+                <a:spcPts val="0"/>
+              </a:spcBef>
+            </a:pPr>
+            <a:r>
+              <a:rPr lang="en-US" dirty="0" smtClean="0"/>
+              <a:t>Math, </a:t>
+            </a:r>
+            <a:r>
+              <a:rPr lang="en-US" dirty="0"/>
+              <a:t>Chess, Steam </a:t>
+            </a:r>
+            <a:r>
+              <a:rPr lang="en-US" dirty="0" smtClean="0"/>
+              <a:t>Engines</a:t>
+            </a:r>
+          </a:p>
+          <a:p>
+            <a:pPr lvl="1">
+              <a:spcBef>
+                <a:spcPts val="0"/>
+              </a:spcBef>
+            </a:pPr>
+            <a:r>
+              <a:rPr lang="en-US" dirty="0" smtClean="0"/>
+              <a:t>Data, Research</a:t>
+            </a:r>
+          </a:p>
+          <a:p>
+            <a:pPr>
+              <a:spcBef>
+                <a:spcPts val="0"/>
+              </a:spcBef>
+            </a:pPr>
+            <a:r>
+              <a:rPr lang="en-US" dirty="0" smtClean="0"/>
+              <a:t>Amplification Effect: Create a framework where lots of little ideas can freely combine into one, or more, greater ideas</a:t>
+            </a:r>
+          </a:p>
+          <a:p>
+            <a:pPr lvl="1">
+              <a:spcBef>
+                <a:spcPts val="0"/>
+              </a:spcBef>
+            </a:pPr>
+            <a:r>
+              <a:rPr lang="en-US" dirty="0" smtClean="0"/>
+              <a:t>Innovation</a:t>
+            </a:r>
+          </a:p>
+          <a:p>
+            <a:pPr lvl="1">
+              <a:spcBef>
+                <a:spcPts val="0"/>
+              </a:spcBef>
+            </a:pPr>
+            <a:r>
+              <a:rPr lang="en-US" dirty="0" smtClean="0"/>
+              <a:t>Collaboration</a:t>
+            </a:r>
+          </a:p>
+          <a:p>
+            <a:pPr lvl="1">
+              <a:spcBef>
+                <a:spcPts val="0"/>
+              </a:spcBef>
+            </a:pPr>
+            <a:r>
+              <a:rPr lang="en-US" dirty="0" smtClean="0"/>
+              <a:t>Solutions to problems</a:t>
+            </a:r>
+          </a:p>
+          <a:p>
+            <a:pPr lvl="2">
+              <a:spcBef>
+                <a:spcPts val="0"/>
+              </a:spcBef>
+            </a:pPr>
+            <a:r>
+              <a:rPr lang="en-US" dirty="0" smtClean="0"/>
+              <a:t>From bug fixes to research solutions</a:t>
+            </a:r>
+            <a:endParaRPr lang="en-US" dirty="0"/>
+          </a:p>
+        </p:txBody>
+      </p:sp>
+    </p:spTree>
+    <p:extLst>
+      <p:ext uri="{BB962C8B-B14F-4D97-AF65-F5344CB8AC3E}">
+        <p14:creationId xmlns:p14="http://schemas.microsoft.com/office/powerpoint/2010/main" val="1552858488"/>
       </p:ext>
     </p:extLst>
   </p:cSld>
@@ -8988,6 +7945,76 @@
 </p:sld>
 </file>
 
+<file path=ppt/slides/slide20.xml><?xml version="1.0" encoding="utf-8"?>
+<p:sld xmlns:a="http://schemas.openxmlformats.org/drawingml/2006/main" xmlns:r="http://schemas.openxmlformats.org/officeDocument/2006/relationships" xmlns:p="http://schemas.openxmlformats.org/presentationml/2006/main">
+  <p:cSld>
+    <p:spTree>
+      <p:nvGrpSpPr>
+        <p:cNvPr id="1" name=""/>
+        <p:cNvGrpSpPr/>
+        <p:nvPr/>
+      </p:nvGrpSpPr>
+      <p:grpSpPr>
+        <a:xfrm>
+          <a:off x="0" y="0"/>
+          <a:ext cx="0" cy="0"/>
+          <a:chOff x="0" y="0"/>
+          <a:chExt cx="0" cy="0"/>
+        </a:xfrm>
+      </p:grpSpPr>
+      <p:sp>
+        <p:nvSpPr>
+          <p:cNvPr id="2" name="Title 1"/>
+          <p:cNvSpPr>
+            <a:spLocks noGrp="1"/>
+          </p:cNvSpPr>
+          <p:nvPr>
+            <p:ph type="ctrTitle"/>
+          </p:nvPr>
+        </p:nvSpPr>
+        <p:spPr>
+          <a:xfrm>
+            <a:off x="685800" y="2130425"/>
+            <a:ext cx="7772400" cy="2468871"/>
+          </a:xfrm>
+        </p:spPr>
+        <p:txBody>
+          <a:bodyPr>
+            <a:normAutofit/>
+          </a:bodyPr>
+          <a:lstStyle/>
+          <a:p>
+            <a:r>
+              <a:rPr lang="en-US" dirty="0" smtClean="0"/>
+              <a:t>END</a:t>
+            </a:r>
+            <a:br>
+              <a:rPr lang="en-US" dirty="0" smtClean="0"/>
+            </a:br>
+            <a:endParaRPr lang="en-US" dirty="0"/>
+          </a:p>
+        </p:txBody>
+      </p:sp>
+    </p:spTree>
+    <p:extLst>
+      <p:ext uri="{BB962C8B-B14F-4D97-AF65-F5344CB8AC3E}">
+        <p14:creationId xmlns:p14="http://schemas.microsoft.com/office/powerpoint/2010/main" val="1024291177"/>
+      </p:ext>
+    </p:extLst>
+  </p:cSld>
+  <p:clrMapOvr>
+    <a:masterClrMapping/>
+  </p:clrMapOvr>
+  <p:timing>
+    <p:tnLst>
+      <p:par>
+        <p:cTn id="1" dur="indefinite" restart="never" nodeType="tmRoot"/>
+      </p:par>
+    </p:tnLst>
+  </p:timing>
+</p:sld>
+</file>
+
 <file path=ppt/slides/slide3.xml><?xml version="1.0" encoding="utf-8"?>
 <p:sld xmlns:a="http://schemas.openxmlformats.org/drawingml/2006/main" xmlns:r="http://schemas.openxmlformats.org/officeDocument/2006/relationships" xmlns:p="http://schemas.openxmlformats.org/presentationml/2006/main">
   <p:cSld>
@@ -9108,11 +8135,11 @@
             </a:pPr>
             <a:r>
               <a:rPr lang="en-US" dirty="0" err="1" smtClean="0"/>
-              <a:t>RHESSys</a:t>
+              <a:t>Rstudio</a:t>
             </a:r>
             <a:r>
               <a:rPr lang="en-US" dirty="0" smtClean="0"/>
-              <a:t>: The Regional Hydro-Ecologic Simulation System</a:t>
+              <a:t> integrated development environment for R</a:t>
             </a:r>
           </a:p>
           <a:p>
@@ -13392,12 +12419,6 @@
 </file>
 
 <file path=customXml/item1.xml><?xml version="1.0" encoding="utf-8"?>
-<p:properties xmlns:p="http://schemas.microsoft.com/office/2006/metadata/properties" xmlns:xsi="http://www.w3.org/2001/XMLSchema-instance" xmlns:pc="http://schemas.microsoft.com/office/infopath/2007/PartnerControls">
-  <documentManagement/>
-</p:properties>
-</file>
-
-<file path=customXml/item2.xml><?xml version="1.0" encoding="utf-8"?>
 <?mso-contentType ?>
 <FormTemplates xmlns="http://schemas.microsoft.com/sharepoint/v3/contenttype/forms">
   <Display>DocumentLibraryForm</Display>
@@ -13406,7 +12427,7 @@
 </FormTemplates>
 </file>
 
-<file path=customXml/item3.xml><?xml version="1.0" encoding="utf-8"?>
+<file path=customXml/item2.xml><?xml version="1.0" encoding="utf-8"?>
 <ct:contentTypeSchema xmlns:ct="http://schemas.microsoft.com/office/2006/metadata/contentType" xmlns:ma="http://schemas.microsoft.com/office/2006/metadata/properties/metaAttributes" ct:_="" ma:_="" ma:contentTypeName="Document" ma:contentTypeID="0x0101008EB671D78AF50D499D1D6164B447FCEE" ma:contentTypeVersion="" ma:contentTypeDescription="Create a new document." ma:contentTypeScope="" ma:versionID="9c1ecbbe78b62fd719a42c922c273ca8">
   <xsd:schema xmlns:xsd="http://www.w3.org/2001/XMLSchema" xmlns:xs="http://www.w3.org/2001/XMLSchema" xmlns:p="http://schemas.microsoft.com/office/2006/metadata/properties" targetNamespace="http://schemas.microsoft.com/office/2006/metadata/properties" ma:root="true" ma:fieldsID="b2384c6cc0088fcedbaf6edaf557defa">
     <xsd:element name="properties">
@@ -13520,16 +12541,13 @@
 </ct:contentTypeSchema>
 </file>
 
-<file path=customXml/itemProps1.xml><?xml version="1.0" encoding="utf-8"?>
-<ds:datastoreItem xmlns:ds="http://schemas.openxmlformats.org/officeDocument/2006/customXml" ds:itemID="{F5546A85-E3FF-4108-9441-5918C19E322A}">
-  <ds:schemaRefs>
-    <ds:schemaRef ds:uri="http://schemas.microsoft.com/office/2006/metadata/properties"/>
-    <ds:schemaRef ds:uri="http://schemas.microsoft.com/office/infopath/2007/PartnerControls"/>
-  </ds:schemaRefs>
-</ds:datastoreItem>
+<file path=customXml/item3.xml><?xml version="1.0" encoding="utf-8"?>
+<p:properties xmlns:p="http://schemas.microsoft.com/office/2006/metadata/properties" xmlns:xsi="http://www.w3.org/2001/XMLSchema-instance" xmlns:pc="http://schemas.microsoft.com/office/infopath/2007/PartnerControls">
+  <documentManagement/>
+</p:properties>
 </file>
 
-<file path=customXml/itemProps2.xml><?xml version="1.0" encoding="utf-8"?>
+<file path=customXml/itemProps1.xml><?xml version="1.0" encoding="utf-8"?>
 <ds:datastoreItem xmlns:ds="http://schemas.openxmlformats.org/officeDocument/2006/customXml" ds:itemID="{B81C4E31-63DB-48E4-B9E1-27749B0D8EE7}">
   <ds:schemaRefs>
     <ds:schemaRef ds:uri="http://schemas.microsoft.com/sharepoint/v3/contenttype/forms"/>
@@ -13537,7 +12555,7 @@
 </ds:datastoreItem>
 </file>
 
-<file path=customXml/itemProps3.xml><?xml version="1.0" encoding="utf-8"?>
+<file path=customXml/itemProps2.xml><?xml version="1.0" encoding="utf-8"?>
 <ds:datastoreItem xmlns:ds="http://schemas.openxmlformats.org/officeDocument/2006/customXml" ds:itemID="{540863D5-0138-47D7-8D34-2E5E37C4F9AD}">
   <ds:schemaRefs>
     <ds:schemaRef ds:uri="http://schemas.microsoft.com/office/2006/metadata/contentType"/>
@@ -13551,4 +12569,13 @@
     <ds:schemaRef ds:uri="http://schemas.microsoft.com/office/infopath/2007/PartnerControls"/>
   </ds:schemaRefs>
 </ds:datastoreItem>
+</file>
+
+<file path=customXml/itemProps3.xml><?xml version="1.0" encoding="utf-8"?>
+<ds:datastoreItem xmlns:ds="http://schemas.openxmlformats.org/officeDocument/2006/customXml" ds:itemID="{F5546A85-E3FF-4108-9441-5918C19E322A}">
+  <ds:schemaRefs>
+    <ds:schemaRef ds:uri="http://schemas.microsoft.com/office/2006/metadata/properties"/>
+    <ds:schemaRef ds:uri="http://schemas.microsoft.com/office/infopath/2007/PartnerControls"/>
+  </ds:schemaRefs>
+</ds:datastoreItem>
 </file>
</xml_diff>